<commit_message>
Updates to the STL presentation.
</commit_message>
<xml_diff>
--- a/Presentations/STL.pptx
+++ b/Presentations/STL.pptx
@@ -13,6 +13,17 @@
     <p:sldId id="261" r:id="rId7"/>
     <p:sldId id="262" r:id="rId8"/>
     <p:sldId id="263" r:id="rId9"/>
+    <p:sldId id="264" r:id="rId10"/>
+    <p:sldId id="265" r:id="rId11"/>
+    <p:sldId id="266" r:id="rId12"/>
+    <p:sldId id="267" r:id="rId13"/>
+    <p:sldId id="268" r:id="rId14"/>
+    <p:sldId id="269" r:id="rId15"/>
+    <p:sldId id="270" r:id="rId16"/>
+    <p:sldId id="271" r:id="rId17"/>
+    <p:sldId id="272" r:id="rId18"/>
+    <p:sldId id="273" r:id="rId19"/>
+    <p:sldId id="274" r:id="rId20"/>
   </p:sldIdLst>
   <p:sldSz cx="12192000" cy="6858000"/>
   <p:notesSz cx="6858000" cy="9144000"/>
@@ -266,7 +277,7 @@
           <a:p>
             <a:fld id="{DE3AA915-2F07-2A46-99A4-70C222AA1B85}" type="datetimeFigureOut">
               <a:rPr lang="en-US" smtClean="0"/>
-              <a:t>7/3/23</a:t>
+              <a:t>9/28/23</a:t>
             </a:fld>
             <a:endParaRPr lang="en-US"/>
           </a:p>
@@ -464,7 +475,7 @@
           <a:p>
             <a:fld id="{DE3AA915-2F07-2A46-99A4-70C222AA1B85}" type="datetimeFigureOut">
               <a:rPr lang="en-US" smtClean="0"/>
-              <a:t>7/3/23</a:t>
+              <a:t>9/28/23</a:t>
             </a:fld>
             <a:endParaRPr lang="en-US"/>
           </a:p>
@@ -672,7 +683,7 @@
           <a:p>
             <a:fld id="{DE3AA915-2F07-2A46-99A4-70C222AA1B85}" type="datetimeFigureOut">
               <a:rPr lang="en-US" smtClean="0"/>
-              <a:t>7/3/23</a:t>
+              <a:t>9/28/23</a:t>
             </a:fld>
             <a:endParaRPr lang="en-US"/>
           </a:p>
@@ -870,7 +881,7 @@
           <a:p>
             <a:fld id="{DE3AA915-2F07-2A46-99A4-70C222AA1B85}" type="datetimeFigureOut">
               <a:rPr lang="en-US" smtClean="0"/>
-              <a:t>7/3/23</a:t>
+              <a:t>9/28/23</a:t>
             </a:fld>
             <a:endParaRPr lang="en-US"/>
           </a:p>
@@ -1145,7 +1156,7 @@
           <a:p>
             <a:fld id="{DE3AA915-2F07-2A46-99A4-70C222AA1B85}" type="datetimeFigureOut">
               <a:rPr lang="en-US" smtClean="0"/>
-              <a:t>7/3/23</a:t>
+              <a:t>9/28/23</a:t>
             </a:fld>
             <a:endParaRPr lang="en-US"/>
           </a:p>
@@ -1410,7 +1421,7 @@
           <a:p>
             <a:fld id="{DE3AA915-2F07-2A46-99A4-70C222AA1B85}" type="datetimeFigureOut">
               <a:rPr lang="en-US" smtClean="0"/>
-              <a:t>7/3/23</a:t>
+              <a:t>9/28/23</a:t>
             </a:fld>
             <a:endParaRPr lang="en-US"/>
           </a:p>
@@ -1822,7 +1833,7 @@
           <a:p>
             <a:fld id="{DE3AA915-2F07-2A46-99A4-70C222AA1B85}" type="datetimeFigureOut">
               <a:rPr lang="en-US" smtClean="0"/>
-              <a:t>7/3/23</a:t>
+              <a:t>9/28/23</a:t>
             </a:fld>
             <a:endParaRPr lang="en-US"/>
           </a:p>
@@ -1963,7 +1974,7 @@
           <a:p>
             <a:fld id="{DE3AA915-2F07-2A46-99A4-70C222AA1B85}" type="datetimeFigureOut">
               <a:rPr lang="en-US" smtClean="0"/>
-              <a:t>7/3/23</a:t>
+              <a:t>9/28/23</a:t>
             </a:fld>
             <a:endParaRPr lang="en-US"/>
           </a:p>
@@ -2076,7 +2087,7 @@
           <a:p>
             <a:fld id="{DE3AA915-2F07-2A46-99A4-70C222AA1B85}" type="datetimeFigureOut">
               <a:rPr lang="en-US" smtClean="0"/>
-              <a:t>7/3/23</a:t>
+              <a:t>9/28/23</a:t>
             </a:fld>
             <a:endParaRPr lang="en-US"/>
           </a:p>
@@ -2387,7 +2398,7 @@
           <a:p>
             <a:fld id="{DE3AA915-2F07-2A46-99A4-70C222AA1B85}" type="datetimeFigureOut">
               <a:rPr lang="en-US" smtClean="0"/>
-              <a:t>7/3/23</a:t>
+              <a:t>9/28/23</a:t>
             </a:fld>
             <a:endParaRPr lang="en-US"/>
           </a:p>
@@ -2675,7 +2686,7 @@
           <a:p>
             <a:fld id="{DE3AA915-2F07-2A46-99A4-70C222AA1B85}" type="datetimeFigureOut">
               <a:rPr lang="en-US" smtClean="0"/>
-              <a:t>7/3/23</a:t>
+              <a:t>9/28/23</a:t>
             </a:fld>
             <a:endParaRPr lang="en-US"/>
           </a:p>
@@ -2916,7 +2927,7 @@
           <a:p>
             <a:fld id="{DE3AA915-2F07-2A46-99A4-70C222AA1B85}" type="datetimeFigureOut">
               <a:rPr lang="en-US" smtClean="0"/>
-              <a:t>7/3/23</a:t>
+              <a:t>9/28/23</a:t>
             </a:fld>
             <a:endParaRPr lang="en-US"/>
           </a:p>
@@ -3417,6 +3428,2692 @@
 </p:sld>
 </file>
 
+<file path=ppt/slides/slide10.xml><?xml version="1.0" encoding="utf-8"?>
+<p:sld xmlns:a="http://schemas.openxmlformats.org/drawingml/2006/main" xmlns:r="http://schemas.openxmlformats.org/officeDocument/2006/relationships" xmlns:p="http://schemas.openxmlformats.org/presentationml/2006/main">
+  <p:cSld>
+    <p:spTree>
+      <p:nvGrpSpPr>
+        <p:cNvPr id="1" name=""/>
+        <p:cNvGrpSpPr/>
+        <p:nvPr/>
+      </p:nvGrpSpPr>
+      <p:grpSpPr>
+        <a:xfrm>
+          <a:off x="0" y="0"/>
+          <a:ext cx="0" cy="0"/>
+          <a:chOff x="0" y="0"/>
+          <a:chExt cx="0" cy="0"/>
+        </a:xfrm>
+      </p:grpSpPr>
+      <p:sp>
+        <p:nvSpPr>
+          <p:cNvPr id="2" name="Title 1">
+            <a:extLst>
+              <a:ext uri="{FF2B5EF4-FFF2-40B4-BE49-F238E27FC236}">
+                <a16:creationId xmlns:a16="http://schemas.microsoft.com/office/drawing/2014/main" id="{D5B6284B-F778-D6E3-41FF-6DFE33E6F78E}"/>
+              </a:ext>
+            </a:extLst>
+          </p:cNvPr>
+          <p:cNvSpPr>
+            <a:spLocks noGrp="1"/>
+          </p:cNvSpPr>
+          <p:nvPr>
+            <p:ph type="title"/>
+          </p:nvPr>
+        </p:nvSpPr>
+        <p:spPr/>
+        <p:txBody>
+          <a:bodyPr/>
+          <a:lstStyle/>
+          <a:p>
+            <a:r>
+              <a:rPr lang="en-US" dirty="0"/>
+              <a:t>Example: Vector Iterators</a:t>
+            </a:r>
+          </a:p>
+        </p:txBody>
+      </p:sp>
+      <p:sp>
+        <p:nvSpPr>
+          <p:cNvPr id="3" name="TextBox 2">
+            <a:extLst>
+              <a:ext uri="{FF2B5EF4-FFF2-40B4-BE49-F238E27FC236}">
+                <a16:creationId xmlns:a16="http://schemas.microsoft.com/office/drawing/2014/main" id="{5252574D-0CB0-185D-A2BB-22A1B880F7B5}"/>
+              </a:ext>
+            </a:extLst>
+          </p:cNvPr>
+          <p:cNvSpPr txBox="1"/>
+          <p:nvPr/>
+        </p:nvSpPr>
+        <p:spPr>
+          <a:xfrm>
+            <a:off x="838200" y="1690688"/>
+            <a:ext cx="11075468" cy="3970318"/>
+          </a:xfrm>
+          <a:prstGeom prst="rect">
+            <a:avLst/>
+          </a:prstGeom>
+          <a:noFill/>
+        </p:spPr>
+        <p:txBody>
+          <a:bodyPr wrap="none" rtlCol="0">
+            <a:spAutoFit/>
+          </a:bodyPr>
+          <a:lstStyle/>
+          <a:p>
+            <a:r>
+              <a:rPr lang="en-US" dirty="0">
+                <a:latin typeface="Consolas" panose="020B0609020204030204" pitchFamily="49" charset="0"/>
+                <a:cs typeface="Consolas" panose="020B0609020204030204" pitchFamily="49" charset="0"/>
+              </a:rPr>
+              <a:t>#include &lt;vector&gt;</a:t>
+            </a:r>
+          </a:p>
+          <a:p>
+            <a:endParaRPr lang="en-US" dirty="0">
+              <a:latin typeface="Consolas" panose="020B0609020204030204" pitchFamily="49" charset="0"/>
+              <a:cs typeface="Consolas" panose="020B0609020204030204" pitchFamily="49" charset="0"/>
+            </a:endParaRPr>
+          </a:p>
+          <a:p>
+            <a:r>
+              <a:rPr lang="en-US" dirty="0">
+                <a:latin typeface="Consolas" panose="020B0609020204030204" pitchFamily="49" charset="0"/>
+                <a:cs typeface="Consolas" panose="020B0609020204030204" pitchFamily="49" charset="0"/>
+              </a:rPr>
+              <a:t>vector&lt;</a:t>
+            </a:r>
+            <a:r>
+              <a:rPr lang="en-US" b="1" dirty="0">
+                <a:latin typeface="Consolas" panose="020B0609020204030204" pitchFamily="49" charset="0"/>
+                <a:cs typeface="Consolas" panose="020B0609020204030204" pitchFamily="49" charset="0"/>
+              </a:rPr>
+              <a:t>int</a:t>
+            </a:r>
+            <a:r>
+              <a:rPr lang="en-US" dirty="0">
+                <a:latin typeface="Consolas" panose="020B0609020204030204" pitchFamily="49" charset="0"/>
+                <a:cs typeface="Consolas" panose="020B0609020204030204" pitchFamily="49" charset="0"/>
+              </a:rPr>
+              <a:t>&gt; </a:t>
+            </a:r>
+            <a:r>
+              <a:rPr lang="en-US" dirty="0" err="1">
+                <a:latin typeface="Consolas" panose="020B0609020204030204" pitchFamily="49" charset="0"/>
+                <a:cs typeface="Consolas" panose="020B0609020204030204" pitchFamily="49" charset="0"/>
+              </a:rPr>
+              <a:t>vec</a:t>
+            </a:r>
+            <a:r>
+              <a:rPr lang="en-US" dirty="0">
+                <a:latin typeface="Consolas" panose="020B0609020204030204" pitchFamily="49" charset="0"/>
+                <a:cs typeface="Consolas" panose="020B0609020204030204" pitchFamily="49" charset="0"/>
+              </a:rPr>
+              <a:t> = { 2, 3, 5, 7, 11, 13, 17, 19 };</a:t>
+            </a:r>
+          </a:p>
+          <a:p>
+            <a:endParaRPr lang="en-US" dirty="0">
+              <a:latin typeface="Consolas" panose="020B0609020204030204" pitchFamily="49" charset="0"/>
+              <a:cs typeface="Consolas" panose="020B0609020204030204" pitchFamily="49" charset="0"/>
+            </a:endParaRPr>
+          </a:p>
+          <a:p>
+            <a:r>
+              <a:rPr lang="en-US" dirty="0">
+                <a:latin typeface="Consolas" panose="020B0609020204030204" pitchFamily="49" charset="0"/>
+                <a:cs typeface="Consolas" panose="020B0609020204030204" pitchFamily="49" charset="0"/>
+              </a:rPr>
+              <a:t>vector&lt;</a:t>
+            </a:r>
+            <a:r>
+              <a:rPr lang="en-US" b="1" dirty="0">
+                <a:latin typeface="Consolas" panose="020B0609020204030204" pitchFamily="49" charset="0"/>
+                <a:cs typeface="Consolas" panose="020B0609020204030204" pitchFamily="49" charset="0"/>
+              </a:rPr>
+              <a:t>int</a:t>
+            </a:r>
+            <a:r>
+              <a:rPr lang="en-US" dirty="0">
+                <a:latin typeface="Consolas" panose="020B0609020204030204" pitchFamily="49" charset="0"/>
+                <a:cs typeface="Consolas" panose="020B0609020204030204" pitchFamily="49" charset="0"/>
+              </a:rPr>
+              <a:t>&gt;::iterator it = </a:t>
+            </a:r>
+            <a:r>
+              <a:rPr lang="en-US" dirty="0" err="1">
+                <a:latin typeface="Consolas" panose="020B0609020204030204" pitchFamily="49" charset="0"/>
+                <a:cs typeface="Consolas" panose="020B0609020204030204" pitchFamily="49" charset="0"/>
+              </a:rPr>
+              <a:t>vec.begin</a:t>
+            </a:r>
+            <a:r>
+              <a:rPr lang="en-US" dirty="0">
+                <a:latin typeface="Consolas" panose="020B0609020204030204" pitchFamily="49" charset="0"/>
+                <a:cs typeface="Consolas" panose="020B0609020204030204" pitchFamily="49" charset="0"/>
+              </a:rPr>
+              <a:t>( );</a:t>
+            </a:r>
+          </a:p>
+          <a:p>
+            <a:r>
+              <a:rPr lang="en-US" dirty="0" err="1">
+                <a:latin typeface="Consolas" panose="020B0609020204030204" pitchFamily="49" charset="0"/>
+                <a:cs typeface="Consolas" panose="020B0609020204030204" pitchFamily="49" charset="0"/>
+              </a:rPr>
+              <a:t>cout</a:t>
+            </a:r>
+            <a:r>
+              <a:rPr lang="en-US" dirty="0">
+                <a:latin typeface="Consolas" panose="020B0609020204030204" pitchFamily="49" charset="0"/>
+                <a:cs typeface="Consolas" panose="020B0609020204030204" pitchFamily="49" charset="0"/>
+              </a:rPr>
+              <a:t> &lt;&lt; *it &lt;&lt; </a:t>
+            </a:r>
+            <a:r>
+              <a:rPr lang="en-US" dirty="0" err="1">
+                <a:latin typeface="Consolas" panose="020B0609020204030204" pitchFamily="49" charset="0"/>
+                <a:cs typeface="Consolas" panose="020B0609020204030204" pitchFamily="49" charset="0"/>
+              </a:rPr>
+              <a:t>endl</a:t>
+            </a:r>
+            <a:r>
+              <a:rPr lang="en-US" dirty="0">
+                <a:latin typeface="Consolas" panose="020B0609020204030204" pitchFamily="49" charset="0"/>
+                <a:cs typeface="Consolas" panose="020B0609020204030204" pitchFamily="49" charset="0"/>
+              </a:rPr>
+              <a:t>;       // Prints 2</a:t>
+            </a:r>
+          </a:p>
+          <a:p>
+            <a:r>
+              <a:rPr lang="en-US" dirty="0" err="1">
+                <a:latin typeface="Consolas" panose="020B0609020204030204" pitchFamily="49" charset="0"/>
+                <a:cs typeface="Consolas" panose="020B0609020204030204" pitchFamily="49" charset="0"/>
+              </a:rPr>
+              <a:t>cout</a:t>
+            </a:r>
+            <a:r>
+              <a:rPr lang="en-US" dirty="0">
+                <a:latin typeface="Consolas" panose="020B0609020204030204" pitchFamily="49" charset="0"/>
+                <a:cs typeface="Consolas" panose="020B0609020204030204" pitchFamily="49" charset="0"/>
+              </a:rPr>
+              <a:t> &lt;&lt; *(it + 3) &lt;&lt; </a:t>
+            </a:r>
+            <a:r>
+              <a:rPr lang="en-US" dirty="0" err="1">
+                <a:latin typeface="Consolas" panose="020B0609020204030204" pitchFamily="49" charset="0"/>
+                <a:cs typeface="Consolas" panose="020B0609020204030204" pitchFamily="49" charset="0"/>
+              </a:rPr>
+              <a:t>endl</a:t>
+            </a:r>
+            <a:r>
+              <a:rPr lang="en-US" dirty="0">
+                <a:latin typeface="Consolas" panose="020B0609020204030204" pitchFamily="49" charset="0"/>
+                <a:cs typeface="Consolas" panose="020B0609020204030204" pitchFamily="49" charset="0"/>
+              </a:rPr>
+              <a:t>; // Prints 7; vector iterators allow pointer-like arithmetic</a:t>
+            </a:r>
+          </a:p>
+          <a:p>
+            <a:r>
+              <a:rPr lang="en-US" dirty="0">
+                <a:latin typeface="Consolas" panose="020B0609020204030204" pitchFamily="49" charset="0"/>
+                <a:cs typeface="Consolas" panose="020B0609020204030204" pitchFamily="49" charset="0"/>
+              </a:rPr>
+              <a:t>++it;                      // Vector iterators allow pointer-like increment</a:t>
+            </a:r>
+          </a:p>
+          <a:p>
+            <a:r>
+              <a:rPr lang="en-US" dirty="0" err="1">
+                <a:latin typeface="Consolas" panose="020B0609020204030204" pitchFamily="49" charset="0"/>
+                <a:cs typeface="Consolas" panose="020B0609020204030204" pitchFamily="49" charset="0"/>
+              </a:rPr>
+              <a:t>cout</a:t>
+            </a:r>
+            <a:r>
+              <a:rPr lang="en-US" dirty="0">
+                <a:latin typeface="Consolas" panose="020B0609020204030204" pitchFamily="49" charset="0"/>
+                <a:cs typeface="Consolas" panose="020B0609020204030204" pitchFamily="49" charset="0"/>
+              </a:rPr>
+              <a:t> &lt;&lt; *it &lt;&lt; </a:t>
+            </a:r>
+            <a:r>
+              <a:rPr lang="en-US" dirty="0" err="1">
+                <a:latin typeface="Consolas" panose="020B0609020204030204" pitchFamily="49" charset="0"/>
+                <a:cs typeface="Consolas" panose="020B0609020204030204" pitchFamily="49" charset="0"/>
+              </a:rPr>
+              <a:t>endl</a:t>
+            </a:r>
+            <a:r>
+              <a:rPr lang="en-US" dirty="0">
+                <a:latin typeface="Consolas" panose="020B0609020204030204" pitchFamily="49" charset="0"/>
+                <a:cs typeface="Consolas" panose="020B0609020204030204" pitchFamily="49" charset="0"/>
+              </a:rPr>
+              <a:t>;       // Prints 3</a:t>
+            </a:r>
+          </a:p>
+          <a:p>
+            <a:endParaRPr lang="en-US" dirty="0">
+              <a:latin typeface="Consolas" panose="020B0609020204030204" pitchFamily="49" charset="0"/>
+              <a:cs typeface="Consolas" panose="020B0609020204030204" pitchFamily="49" charset="0"/>
+            </a:endParaRPr>
+          </a:p>
+          <a:p>
+            <a:r>
+              <a:rPr lang="en-US" dirty="0">
+                <a:latin typeface="Consolas" panose="020B0609020204030204" pitchFamily="49" charset="0"/>
+                <a:cs typeface="Consolas" panose="020B0609020204030204" pitchFamily="49" charset="0"/>
+              </a:rPr>
+              <a:t>it = </a:t>
+            </a:r>
+            <a:r>
+              <a:rPr lang="en-US" dirty="0" err="1">
+                <a:latin typeface="Consolas" panose="020B0609020204030204" pitchFamily="49" charset="0"/>
+                <a:cs typeface="Consolas" panose="020B0609020204030204" pitchFamily="49" charset="0"/>
+              </a:rPr>
+              <a:t>vec.end</a:t>
+            </a:r>
+            <a:r>
+              <a:rPr lang="en-US" dirty="0">
+                <a:latin typeface="Consolas" panose="020B0609020204030204" pitchFamily="49" charset="0"/>
+                <a:cs typeface="Consolas" panose="020B0609020204030204" pitchFamily="49" charset="0"/>
+              </a:rPr>
+              <a:t>( );</a:t>
+            </a:r>
+          </a:p>
+          <a:p>
+            <a:r>
+              <a:rPr lang="en-US" dirty="0" err="1">
+                <a:latin typeface="Consolas" panose="020B0609020204030204" pitchFamily="49" charset="0"/>
+                <a:cs typeface="Consolas" panose="020B0609020204030204" pitchFamily="49" charset="0"/>
+              </a:rPr>
+              <a:t>cout</a:t>
+            </a:r>
+            <a:r>
+              <a:rPr lang="en-US" dirty="0">
+                <a:latin typeface="Consolas" panose="020B0609020204030204" pitchFamily="49" charset="0"/>
+                <a:cs typeface="Consolas" panose="020B0609020204030204" pitchFamily="49" charset="0"/>
+              </a:rPr>
+              <a:t> &lt;&lt; *it &lt;&lt; </a:t>
+            </a:r>
+            <a:r>
+              <a:rPr lang="en-US" dirty="0" err="1">
+                <a:latin typeface="Consolas" panose="020B0609020204030204" pitchFamily="49" charset="0"/>
+                <a:cs typeface="Consolas" panose="020B0609020204030204" pitchFamily="49" charset="0"/>
+              </a:rPr>
+              <a:t>endl</a:t>
+            </a:r>
+            <a:r>
+              <a:rPr lang="en-US" dirty="0">
+                <a:latin typeface="Consolas" panose="020B0609020204030204" pitchFamily="49" charset="0"/>
+                <a:cs typeface="Consolas" panose="020B0609020204030204" pitchFamily="49" charset="0"/>
+              </a:rPr>
+              <a:t>;       // UNDEFINED! The end iterator points off the end!</a:t>
+            </a:r>
+          </a:p>
+          <a:p>
+            <a:r>
+              <a:rPr lang="en-US" dirty="0">
+                <a:latin typeface="Consolas" panose="020B0609020204030204" pitchFamily="49" charset="0"/>
+                <a:cs typeface="Consolas" panose="020B0609020204030204" pitchFamily="49" charset="0"/>
+              </a:rPr>
+              <a:t>--it;</a:t>
+            </a:r>
+          </a:p>
+          <a:p>
+            <a:r>
+              <a:rPr lang="en-US" dirty="0" err="1">
+                <a:latin typeface="Consolas" panose="020B0609020204030204" pitchFamily="49" charset="0"/>
+                <a:cs typeface="Consolas" panose="020B0609020204030204" pitchFamily="49" charset="0"/>
+              </a:rPr>
+              <a:t>cout</a:t>
+            </a:r>
+            <a:r>
+              <a:rPr lang="en-US" dirty="0">
+                <a:latin typeface="Consolas" panose="020B0609020204030204" pitchFamily="49" charset="0"/>
+                <a:cs typeface="Consolas" panose="020B0609020204030204" pitchFamily="49" charset="0"/>
+              </a:rPr>
+              <a:t> &lt;&lt; *it &lt;&lt; </a:t>
+            </a:r>
+            <a:r>
+              <a:rPr lang="en-US" dirty="0" err="1">
+                <a:latin typeface="Consolas" panose="020B0609020204030204" pitchFamily="49" charset="0"/>
+                <a:cs typeface="Consolas" panose="020B0609020204030204" pitchFamily="49" charset="0"/>
+              </a:rPr>
+              <a:t>endl</a:t>
+            </a:r>
+            <a:r>
+              <a:rPr lang="en-US" dirty="0">
+                <a:latin typeface="Consolas" panose="020B0609020204030204" pitchFamily="49" charset="0"/>
+                <a:cs typeface="Consolas" panose="020B0609020204030204" pitchFamily="49" charset="0"/>
+              </a:rPr>
+              <a:t>;       // Prints 19</a:t>
+            </a:r>
+          </a:p>
+        </p:txBody>
+      </p:sp>
+    </p:spTree>
+    <p:extLst>
+      <p:ext uri="{BB962C8B-B14F-4D97-AF65-F5344CB8AC3E}">
+        <p14:creationId xmlns:p14="http://schemas.microsoft.com/office/powerpoint/2010/main" val="3793171779"/>
+      </p:ext>
+    </p:extLst>
+  </p:cSld>
+  <p:clrMapOvr>
+    <a:masterClrMapping/>
+  </p:clrMapOvr>
+</p:sld>
+</file>
+
+<file path=ppt/slides/slide11.xml><?xml version="1.0" encoding="utf-8"?>
+<p:sld xmlns:a="http://schemas.openxmlformats.org/drawingml/2006/main" xmlns:r="http://schemas.openxmlformats.org/officeDocument/2006/relationships" xmlns:p="http://schemas.openxmlformats.org/presentationml/2006/main">
+  <p:cSld>
+    <p:spTree>
+      <p:nvGrpSpPr>
+        <p:cNvPr id="1" name=""/>
+        <p:cNvGrpSpPr/>
+        <p:nvPr/>
+      </p:nvGrpSpPr>
+      <p:grpSpPr>
+        <a:xfrm>
+          <a:off x="0" y="0"/>
+          <a:ext cx="0" cy="0"/>
+          <a:chOff x="0" y="0"/>
+          <a:chExt cx="0" cy="0"/>
+        </a:xfrm>
+      </p:grpSpPr>
+      <p:sp>
+        <p:nvSpPr>
+          <p:cNvPr id="2" name="Title 1">
+            <a:extLst>
+              <a:ext uri="{FF2B5EF4-FFF2-40B4-BE49-F238E27FC236}">
+                <a16:creationId xmlns:a16="http://schemas.microsoft.com/office/drawing/2014/main" id="{E26B5252-6AB6-4A34-92A7-7A7FE2EE0F92}"/>
+              </a:ext>
+            </a:extLst>
+          </p:cNvPr>
+          <p:cNvSpPr>
+            <a:spLocks noGrp="1"/>
+          </p:cNvSpPr>
+          <p:nvPr>
+            <p:ph type="title"/>
+          </p:nvPr>
+        </p:nvSpPr>
+        <p:spPr/>
+        <p:txBody>
+          <a:bodyPr/>
+          <a:lstStyle/>
+          <a:p>
+            <a:r>
+              <a:rPr lang="en-US" dirty="0"/>
+              <a:t>Iterator Types</a:t>
+            </a:r>
+          </a:p>
+        </p:txBody>
+      </p:sp>
+      <p:sp>
+        <p:nvSpPr>
+          <p:cNvPr id="3" name="TextBox 2">
+            <a:extLst>
+              <a:ext uri="{FF2B5EF4-FFF2-40B4-BE49-F238E27FC236}">
+                <a16:creationId xmlns:a16="http://schemas.microsoft.com/office/drawing/2014/main" id="{55E1CC57-D13A-BFB5-765D-3DFC8DCB6840}"/>
+              </a:ext>
+            </a:extLst>
+          </p:cNvPr>
+          <p:cNvSpPr txBox="1"/>
+          <p:nvPr/>
+        </p:nvSpPr>
+        <p:spPr>
+          <a:xfrm>
+            <a:off x="838200" y="1690688"/>
+            <a:ext cx="9935733" cy="4524315"/>
+          </a:xfrm>
+          <a:prstGeom prst="rect">
+            <a:avLst/>
+          </a:prstGeom>
+          <a:noFill/>
+        </p:spPr>
+        <p:txBody>
+          <a:bodyPr wrap="none" rtlCol="0">
+            <a:spAutoFit/>
+          </a:bodyPr>
+          <a:lstStyle/>
+          <a:p>
+            <a:r>
+              <a:rPr lang="en-US" dirty="0">
+                <a:latin typeface="Consolas" panose="020B0609020204030204" pitchFamily="49" charset="0"/>
+                <a:cs typeface="Consolas" panose="020B0609020204030204" pitchFamily="49" charset="0"/>
+              </a:rPr>
+              <a:t>#include &lt;list&gt;</a:t>
+            </a:r>
+          </a:p>
+          <a:p>
+            <a:r>
+              <a:rPr lang="en-US" dirty="0">
+                <a:latin typeface="Consolas" panose="020B0609020204030204" pitchFamily="49" charset="0"/>
+                <a:cs typeface="Consolas" panose="020B0609020204030204" pitchFamily="49" charset="0"/>
+              </a:rPr>
+              <a:t>#include &lt;vector&gt;</a:t>
+            </a:r>
+          </a:p>
+          <a:p>
+            <a:endParaRPr lang="en-US" dirty="0">
+              <a:latin typeface="Consolas" panose="020B0609020204030204" pitchFamily="49" charset="0"/>
+              <a:cs typeface="Consolas" panose="020B0609020204030204" pitchFamily="49" charset="0"/>
+            </a:endParaRPr>
+          </a:p>
+          <a:p>
+            <a:r>
+              <a:rPr lang="en-US" dirty="0">
+                <a:latin typeface="Consolas" panose="020B0609020204030204" pitchFamily="49" charset="0"/>
+                <a:cs typeface="Consolas" panose="020B0609020204030204" pitchFamily="49" charset="0"/>
+              </a:rPr>
+              <a:t>vector&lt;</a:t>
+            </a:r>
+            <a:r>
+              <a:rPr lang="en-US" b="1" dirty="0">
+                <a:latin typeface="Consolas" panose="020B0609020204030204" pitchFamily="49" charset="0"/>
+                <a:cs typeface="Consolas" panose="020B0609020204030204" pitchFamily="49" charset="0"/>
+              </a:rPr>
+              <a:t>int</a:t>
+            </a:r>
+            <a:r>
+              <a:rPr lang="en-US" dirty="0">
+                <a:latin typeface="Consolas" panose="020B0609020204030204" pitchFamily="49" charset="0"/>
+                <a:cs typeface="Consolas" panose="020B0609020204030204" pitchFamily="49" charset="0"/>
+              </a:rPr>
+              <a:t>&gt;    </a:t>
+            </a:r>
+            <a:r>
+              <a:rPr lang="en-US" dirty="0" err="1">
+                <a:latin typeface="Consolas" panose="020B0609020204030204" pitchFamily="49" charset="0"/>
+                <a:cs typeface="Consolas" panose="020B0609020204030204" pitchFamily="49" charset="0"/>
+              </a:rPr>
+              <a:t>vec</a:t>
+            </a:r>
+            <a:r>
+              <a:rPr lang="en-US" dirty="0">
+                <a:latin typeface="Consolas" panose="020B0609020204030204" pitchFamily="49" charset="0"/>
+                <a:cs typeface="Consolas" panose="020B0609020204030204" pitchFamily="49" charset="0"/>
+              </a:rPr>
+              <a:t>  = { 2, 3, 5, 7, 11, 13, 17, 19 };</a:t>
+            </a:r>
+          </a:p>
+          <a:p>
+            <a:r>
+              <a:rPr lang="en-US" dirty="0">
+                <a:latin typeface="Consolas" panose="020B0609020204030204" pitchFamily="49" charset="0"/>
+                <a:cs typeface="Consolas" panose="020B0609020204030204" pitchFamily="49" charset="0"/>
+              </a:rPr>
+              <a:t>vector&lt;</a:t>
+            </a:r>
+            <a:r>
+              <a:rPr lang="en-US" b="1" dirty="0">
+                <a:latin typeface="Consolas" panose="020B0609020204030204" pitchFamily="49" charset="0"/>
+                <a:cs typeface="Consolas" panose="020B0609020204030204" pitchFamily="49" charset="0"/>
+              </a:rPr>
+              <a:t>double</a:t>
+            </a:r>
+            <a:r>
+              <a:rPr lang="en-US" dirty="0">
+                <a:latin typeface="Consolas" panose="020B0609020204030204" pitchFamily="49" charset="0"/>
+                <a:cs typeface="Consolas" panose="020B0609020204030204" pitchFamily="49" charset="0"/>
+              </a:rPr>
+              <a:t>&gt; </a:t>
+            </a:r>
+            <a:r>
+              <a:rPr lang="en-US" dirty="0" err="1">
+                <a:latin typeface="Consolas" panose="020B0609020204030204" pitchFamily="49" charset="0"/>
+                <a:cs typeface="Consolas" panose="020B0609020204030204" pitchFamily="49" charset="0"/>
+              </a:rPr>
+              <a:t>dvec</a:t>
+            </a:r>
+            <a:r>
+              <a:rPr lang="en-US" dirty="0">
+                <a:latin typeface="Consolas" panose="020B0609020204030204" pitchFamily="49" charset="0"/>
+                <a:cs typeface="Consolas" panose="020B0609020204030204" pitchFamily="49" charset="0"/>
+              </a:rPr>
+              <a:t> = { 3.14, 2.78, 1.62 };</a:t>
+            </a:r>
+          </a:p>
+          <a:p>
+            <a:r>
+              <a:rPr lang="en-US" dirty="0">
+                <a:latin typeface="Consolas" panose="020B0609020204030204" pitchFamily="49" charset="0"/>
+                <a:cs typeface="Consolas" panose="020B0609020204030204" pitchFamily="49" charset="0"/>
+              </a:rPr>
+              <a:t>list&lt;</a:t>
+            </a:r>
+            <a:r>
+              <a:rPr lang="en-US" b="1" dirty="0">
+                <a:latin typeface="Consolas" panose="020B0609020204030204" pitchFamily="49" charset="0"/>
+                <a:cs typeface="Consolas" panose="020B0609020204030204" pitchFamily="49" charset="0"/>
+              </a:rPr>
+              <a:t>int</a:t>
+            </a:r>
+            <a:r>
+              <a:rPr lang="en-US" dirty="0">
+                <a:latin typeface="Consolas" panose="020B0609020204030204" pitchFamily="49" charset="0"/>
+                <a:cs typeface="Consolas" panose="020B0609020204030204" pitchFamily="49" charset="0"/>
+              </a:rPr>
+              <a:t>&gt;      </a:t>
+            </a:r>
+            <a:r>
+              <a:rPr lang="en-US" dirty="0" err="1">
+                <a:latin typeface="Consolas" panose="020B0609020204030204" pitchFamily="49" charset="0"/>
+                <a:cs typeface="Consolas" panose="020B0609020204030204" pitchFamily="49" charset="0"/>
+              </a:rPr>
+              <a:t>lst</a:t>
+            </a:r>
+            <a:r>
+              <a:rPr lang="en-US" dirty="0">
+                <a:latin typeface="Consolas" panose="020B0609020204030204" pitchFamily="49" charset="0"/>
+                <a:cs typeface="Consolas" panose="020B0609020204030204" pitchFamily="49" charset="0"/>
+              </a:rPr>
+              <a:t>  = { 2, 3, 5, 7, 11, 13, 17, 19 };</a:t>
+            </a:r>
+          </a:p>
+          <a:p>
+            <a:endParaRPr lang="en-US" dirty="0">
+              <a:latin typeface="Consolas" panose="020B0609020204030204" pitchFamily="49" charset="0"/>
+              <a:cs typeface="Consolas" panose="020B0609020204030204" pitchFamily="49" charset="0"/>
+            </a:endParaRPr>
+          </a:p>
+          <a:p>
+            <a:r>
+              <a:rPr lang="en-US" dirty="0">
+                <a:latin typeface="Consolas" panose="020B0609020204030204" pitchFamily="49" charset="0"/>
+                <a:cs typeface="Consolas" panose="020B0609020204030204" pitchFamily="49" charset="0"/>
+              </a:rPr>
+              <a:t>vector&lt;</a:t>
+            </a:r>
+            <a:r>
+              <a:rPr lang="en-US" b="1" dirty="0">
+                <a:latin typeface="Consolas" panose="020B0609020204030204" pitchFamily="49" charset="0"/>
+                <a:cs typeface="Consolas" panose="020B0609020204030204" pitchFamily="49" charset="0"/>
+              </a:rPr>
+              <a:t>int</a:t>
+            </a:r>
+            <a:r>
+              <a:rPr lang="en-US" dirty="0">
+                <a:latin typeface="Consolas" panose="020B0609020204030204" pitchFamily="49" charset="0"/>
+                <a:cs typeface="Consolas" panose="020B0609020204030204" pitchFamily="49" charset="0"/>
+              </a:rPr>
+              <a:t>&gt;::iterator    it_1 = </a:t>
+            </a:r>
+            <a:r>
+              <a:rPr lang="en-US" dirty="0" err="1">
+                <a:latin typeface="Consolas" panose="020B0609020204030204" pitchFamily="49" charset="0"/>
+                <a:cs typeface="Consolas" panose="020B0609020204030204" pitchFamily="49" charset="0"/>
+              </a:rPr>
+              <a:t>vec.begin</a:t>
+            </a:r>
+            <a:r>
+              <a:rPr lang="en-US" dirty="0">
+                <a:latin typeface="Consolas" panose="020B0609020204030204" pitchFamily="49" charset="0"/>
+                <a:cs typeface="Consolas" panose="020B0609020204030204" pitchFamily="49" charset="0"/>
+              </a:rPr>
+              <a:t>( );</a:t>
+            </a:r>
+          </a:p>
+          <a:p>
+            <a:r>
+              <a:rPr lang="en-US" dirty="0">
+                <a:latin typeface="Consolas" panose="020B0609020204030204" pitchFamily="49" charset="0"/>
+                <a:cs typeface="Consolas" panose="020B0609020204030204" pitchFamily="49" charset="0"/>
+              </a:rPr>
+              <a:t>vector&lt;</a:t>
+            </a:r>
+            <a:r>
+              <a:rPr lang="en-US" b="1" dirty="0">
+                <a:latin typeface="Consolas" panose="020B0609020204030204" pitchFamily="49" charset="0"/>
+                <a:cs typeface="Consolas" panose="020B0609020204030204" pitchFamily="49" charset="0"/>
+              </a:rPr>
+              <a:t>double</a:t>
+            </a:r>
+            <a:r>
+              <a:rPr lang="en-US" dirty="0">
+                <a:latin typeface="Consolas" panose="020B0609020204030204" pitchFamily="49" charset="0"/>
+                <a:cs typeface="Consolas" panose="020B0609020204030204" pitchFamily="49" charset="0"/>
+              </a:rPr>
+              <a:t>&gt;::iterator it_2 = </a:t>
+            </a:r>
+            <a:r>
+              <a:rPr lang="en-US" dirty="0" err="1">
+                <a:latin typeface="Consolas" panose="020B0609020204030204" pitchFamily="49" charset="0"/>
+                <a:cs typeface="Consolas" panose="020B0609020204030204" pitchFamily="49" charset="0"/>
+              </a:rPr>
+              <a:t>dvec.begin</a:t>
+            </a:r>
+            <a:r>
+              <a:rPr lang="en-US" dirty="0">
+                <a:latin typeface="Consolas" panose="020B0609020204030204" pitchFamily="49" charset="0"/>
+                <a:cs typeface="Consolas" panose="020B0609020204030204" pitchFamily="49" charset="0"/>
+              </a:rPr>
+              <a:t>( );</a:t>
+            </a:r>
+          </a:p>
+          <a:p>
+            <a:r>
+              <a:rPr lang="en-US" dirty="0">
+                <a:latin typeface="Consolas" panose="020B0609020204030204" pitchFamily="49" charset="0"/>
+                <a:cs typeface="Consolas" panose="020B0609020204030204" pitchFamily="49" charset="0"/>
+              </a:rPr>
+              <a:t>list&lt;</a:t>
+            </a:r>
+            <a:r>
+              <a:rPr lang="en-US" b="1" dirty="0">
+                <a:latin typeface="Consolas" panose="020B0609020204030204" pitchFamily="49" charset="0"/>
+                <a:cs typeface="Consolas" panose="020B0609020204030204" pitchFamily="49" charset="0"/>
+              </a:rPr>
+              <a:t>int</a:t>
+            </a:r>
+            <a:r>
+              <a:rPr lang="en-US" dirty="0">
+                <a:latin typeface="Consolas" panose="020B0609020204030204" pitchFamily="49" charset="0"/>
+                <a:cs typeface="Consolas" panose="020B0609020204030204" pitchFamily="49" charset="0"/>
+              </a:rPr>
+              <a:t>&gt;::iterator.     it_3 = </a:t>
+            </a:r>
+            <a:r>
+              <a:rPr lang="en-US" dirty="0" err="1">
+                <a:latin typeface="Consolas" panose="020B0609020204030204" pitchFamily="49" charset="0"/>
+                <a:cs typeface="Consolas" panose="020B0609020204030204" pitchFamily="49" charset="0"/>
+              </a:rPr>
+              <a:t>lst.begin</a:t>
+            </a:r>
+            <a:r>
+              <a:rPr lang="en-US" dirty="0">
+                <a:latin typeface="Consolas" panose="020B0609020204030204" pitchFamily="49" charset="0"/>
+                <a:cs typeface="Consolas" panose="020B0609020204030204" pitchFamily="49" charset="0"/>
+              </a:rPr>
+              <a:t>( );</a:t>
+            </a:r>
+          </a:p>
+          <a:p>
+            <a:endParaRPr lang="en-US" dirty="0">
+              <a:latin typeface="Consolas" panose="020B0609020204030204" pitchFamily="49" charset="0"/>
+              <a:cs typeface="Consolas" panose="020B0609020204030204" pitchFamily="49" charset="0"/>
+            </a:endParaRPr>
+          </a:p>
+          <a:p>
+            <a:r>
+              <a:rPr lang="en-US" dirty="0">
+                <a:latin typeface="Consolas" panose="020B0609020204030204" pitchFamily="49" charset="0"/>
+                <a:cs typeface="Consolas" panose="020B0609020204030204" pitchFamily="49" charset="0"/>
+              </a:rPr>
+              <a:t>it_1 = it_2;   // Error! Type mismatch!</a:t>
+            </a:r>
+          </a:p>
+          <a:p>
+            <a:r>
+              <a:rPr lang="en-US" dirty="0">
+                <a:latin typeface="Consolas" panose="020B0609020204030204" pitchFamily="49" charset="0"/>
+                <a:cs typeface="Consolas" panose="020B0609020204030204" pitchFamily="49" charset="0"/>
+              </a:rPr>
+              <a:t>  // vector&lt;double&gt;::iterator is a different type than vector&lt;int&gt;::iterator.</a:t>
+            </a:r>
+          </a:p>
+          <a:p>
+            <a:endParaRPr lang="en-US" dirty="0">
+              <a:latin typeface="Consolas" panose="020B0609020204030204" pitchFamily="49" charset="0"/>
+              <a:cs typeface="Consolas" panose="020B0609020204030204" pitchFamily="49" charset="0"/>
+            </a:endParaRPr>
+          </a:p>
+          <a:p>
+            <a:r>
+              <a:rPr lang="en-US" dirty="0">
+                <a:latin typeface="Consolas" panose="020B0609020204030204" pitchFamily="49" charset="0"/>
+                <a:cs typeface="Consolas" panose="020B0609020204030204" pitchFamily="49" charset="0"/>
+              </a:rPr>
+              <a:t>it_1 = it_3;   // Error! Type mismatch!</a:t>
+            </a:r>
+          </a:p>
+          <a:p>
+            <a:r>
+              <a:rPr lang="en-US" dirty="0">
+                <a:latin typeface="Consolas" panose="020B0609020204030204" pitchFamily="49" charset="0"/>
+                <a:cs typeface="Consolas" panose="020B0609020204030204" pitchFamily="49" charset="0"/>
+              </a:rPr>
+              <a:t>  // list&lt;int&gt;::iterator is a different type than vector&lt;int&gt;::iterator.</a:t>
+            </a:r>
+          </a:p>
+        </p:txBody>
+      </p:sp>
+    </p:spTree>
+    <p:extLst>
+      <p:ext uri="{BB962C8B-B14F-4D97-AF65-F5344CB8AC3E}">
+        <p14:creationId xmlns:p14="http://schemas.microsoft.com/office/powerpoint/2010/main" val="625847479"/>
+      </p:ext>
+    </p:extLst>
+  </p:cSld>
+  <p:clrMapOvr>
+    <a:masterClrMapping/>
+  </p:clrMapOvr>
+</p:sld>
+</file>
+
+<file path=ppt/slides/slide12.xml><?xml version="1.0" encoding="utf-8"?>
+<p:sld xmlns:a="http://schemas.openxmlformats.org/drawingml/2006/main" xmlns:r="http://schemas.openxmlformats.org/officeDocument/2006/relationships" xmlns:p="http://schemas.openxmlformats.org/presentationml/2006/main">
+  <p:cSld>
+    <p:spTree>
+      <p:nvGrpSpPr>
+        <p:cNvPr id="1" name=""/>
+        <p:cNvGrpSpPr/>
+        <p:nvPr/>
+      </p:nvGrpSpPr>
+      <p:grpSpPr>
+        <a:xfrm>
+          <a:off x="0" y="0"/>
+          <a:ext cx="0" cy="0"/>
+          <a:chOff x="0" y="0"/>
+          <a:chExt cx="0" cy="0"/>
+        </a:xfrm>
+      </p:grpSpPr>
+      <p:sp>
+        <p:nvSpPr>
+          <p:cNvPr id="2" name="Title 1">
+            <a:extLst>
+              <a:ext uri="{FF2B5EF4-FFF2-40B4-BE49-F238E27FC236}">
+                <a16:creationId xmlns:a16="http://schemas.microsoft.com/office/drawing/2014/main" id="{C6D67D53-D9FC-295D-54E4-EF645CB30633}"/>
+              </a:ext>
+            </a:extLst>
+          </p:cNvPr>
+          <p:cNvSpPr>
+            <a:spLocks noGrp="1"/>
+          </p:cNvSpPr>
+          <p:nvPr>
+            <p:ph type="title"/>
+          </p:nvPr>
+        </p:nvSpPr>
+        <p:spPr/>
+        <p:txBody>
+          <a:bodyPr/>
+          <a:lstStyle/>
+          <a:p>
+            <a:r>
+              <a:rPr lang="en-US" dirty="0"/>
+              <a:t>Iterator Categories</a:t>
+            </a:r>
+          </a:p>
+        </p:txBody>
+      </p:sp>
+      <p:sp>
+        <p:nvSpPr>
+          <p:cNvPr id="3" name="Content Placeholder 2">
+            <a:extLst>
+              <a:ext uri="{FF2B5EF4-FFF2-40B4-BE49-F238E27FC236}">
+                <a16:creationId xmlns:a16="http://schemas.microsoft.com/office/drawing/2014/main" id="{894C143A-D747-D590-0F7B-58C5C20EA76A}"/>
+              </a:ext>
+            </a:extLst>
+          </p:cNvPr>
+          <p:cNvSpPr>
+            <a:spLocks noGrp="1"/>
+          </p:cNvSpPr>
+          <p:nvPr>
+            <p:ph idx="1"/>
+          </p:nvPr>
+        </p:nvSpPr>
+        <p:spPr>
+          <a:xfrm>
+            <a:off x="838200" y="1690688"/>
+            <a:ext cx="10515600" cy="4351338"/>
+          </a:xfrm>
+        </p:spPr>
+        <p:txBody>
+          <a:bodyPr/>
+          <a:lstStyle/>
+          <a:p>
+            <a:r>
+              <a:rPr lang="en-US" dirty="0"/>
+              <a:t>In this diagram, the arrows point in the direction of increasing capability. </a:t>
+            </a:r>
+            <a:r>
+              <a:rPr lang="en-US" b="1" dirty="0"/>
+              <a:t>This is not a UML class diagram! </a:t>
+            </a:r>
+            <a:r>
+              <a:rPr lang="en-US" u="sng" dirty="0"/>
+              <a:t>Iterator categories are not types!</a:t>
+            </a:r>
+          </a:p>
+        </p:txBody>
+      </p:sp>
+      <p:sp>
+        <p:nvSpPr>
+          <p:cNvPr id="4" name="Rectangle 3">
+            <a:extLst>
+              <a:ext uri="{FF2B5EF4-FFF2-40B4-BE49-F238E27FC236}">
+                <a16:creationId xmlns:a16="http://schemas.microsoft.com/office/drawing/2014/main" id="{8677E293-4355-7A51-9A14-FAA3DBFB0F39}"/>
+              </a:ext>
+            </a:extLst>
+          </p:cNvPr>
+          <p:cNvSpPr/>
+          <p:nvPr/>
+        </p:nvSpPr>
+        <p:spPr>
+          <a:xfrm>
+            <a:off x="4506687" y="3016251"/>
+            <a:ext cx="2536371" cy="457200"/>
+          </a:xfrm>
+          <a:prstGeom prst="rect">
+            <a:avLst/>
+          </a:prstGeom>
+        </p:spPr>
+        <p:style>
+          <a:lnRef idx="2">
+            <a:schemeClr val="accent1">
+              <a:shade val="15000"/>
+            </a:schemeClr>
+          </a:lnRef>
+          <a:fillRef idx="1">
+            <a:schemeClr val="accent1"/>
+          </a:fillRef>
+          <a:effectRef idx="0">
+            <a:schemeClr val="accent1"/>
+          </a:effectRef>
+          <a:fontRef idx="minor">
+            <a:schemeClr val="lt1"/>
+          </a:fontRef>
+        </p:style>
+        <p:txBody>
+          <a:bodyPr rtlCol="0" anchor="ctr"/>
+          <a:lstStyle/>
+          <a:p>
+            <a:pPr algn="ctr"/>
+            <a:r>
+              <a:rPr lang="en-US" dirty="0"/>
+              <a:t>Random Access</a:t>
+            </a:r>
+          </a:p>
+        </p:txBody>
+      </p:sp>
+      <p:sp>
+        <p:nvSpPr>
+          <p:cNvPr id="5" name="Rectangle 4">
+            <a:extLst>
+              <a:ext uri="{FF2B5EF4-FFF2-40B4-BE49-F238E27FC236}">
+                <a16:creationId xmlns:a16="http://schemas.microsoft.com/office/drawing/2014/main" id="{5408A616-4751-264D-4EB5-82292D9A9C8E}"/>
+              </a:ext>
+            </a:extLst>
+          </p:cNvPr>
+          <p:cNvSpPr/>
+          <p:nvPr/>
+        </p:nvSpPr>
+        <p:spPr>
+          <a:xfrm>
+            <a:off x="4506686" y="3752510"/>
+            <a:ext cx="2536371" cy="457200"/>
+          </a:xfrm>
+          <a:prstGeom prst="rect">
+            <a:avLst/>
+          </a:prstGeom>
+        </p:spPr>
+        <p:style>
+          <a:lnRef idx="2">
+            <a:schemeClr val="accent1">
+              <a:shade val="15000"/>
+            </a:schemeClr>
+          </a:lnRef>
+          <a:fillRef idx="1">
+            <a:schemeClr val="accent1"/>
+          </a:fillRef>
+          <a:effectRef idx="0">
+            <a:schemeClr val="accent1"/>
+          </a:effectRef>
+          <a:fontRef idx="minor">
+            <a:schemeClr val="lt1"/>
+          </a:fontRef>
+        </p:style>
+        <p:txBody>
+          <a:bodyPr rtlCol="0" anchor="ctr"/>
+          <a:lstStyle/>
+          <a:p>
+            <a:pPr algn="ctr"/>
+            <a:r>
+              <a:rPr lang="en-US" dirty="0"/>
+              <a:t>Bidirectional</a:t>
+            </a:r>
+          </a:p>
+        </p:txBody>
+      </p:sp>
+      <p:sp>
+        <p:nvSpPr>
+          <p:cNvPr id="6" name="Rectangle 5">
+            <a:extLst>
+              <a:ext uri="{FF2B5EF4-FFF2-40B4-BE49-F238E27FC236}">
+                <a16:creationId xmlns:a16="http://schemas.microsoft.com/office/drawing/2014/main" id="{9E122BCC-8004-DEB5-BF5E-10F4CC182E63}"/>
+              </a:ext>
+            </a:extLst>
+          </p:cNvPr>
+          <p:cNvSpPr/>
+          <p:nvPr/>
+        </p:nvSpPr>
+        <p:spPr>
+          <a:xfrm>
+            <a:off x="4506685" y="4488769"/>
+            <a:ext cx="2536371" cy="457200"/>
+          </a:xfrm>
+          <a:prstGeom prst="rect">
+            <a:avLst/>
+          </a:prstGeom>
+        </p:spPr>
+        <p:style>
+          <a:lnRef idx="2">
+            <a:schemeClr val="accent1">
+              <a:shade val="15000"/>
+            </a:schemeClr>
+          </a:lnRef>
+          <a:fillRef idx="1">
+            <a:schemeClr val="accent1"/>
+          </a:fillRef>
+          <a:effectRef idx="0">
+            <a:schemeClr val="accent1"/>
+          </a:effectRef>
+          <a:fontRef idx="minor">
+            <a:schemeClr val="lt1"/>
+          </a:fontRef>
+        </p:style>
+        <p:txBody>
+          <a:bodyPr rtlCol="0" anchor="ctr"/>
+          <a:lstStyle/>
+          <a:p>
+            <a:pPr algn="ctr"/>
+            <a:r>
+              <a:rPr lang="en-US" dirty="0"/>
+              <a:t>Forward</a:t>
+            </a:r>
+          </a:p>
+        </p:txBody>
+      </p:sp>
+      <p:sp>
+        <p:nvSpPr>
+          <p:cNvPr id="7" name="Rectangle 6">
+            <a:extLst>
+              <a:ext uri="{FF2B5EF4-FFF2-40B4-BE49-F238E27FC236}">
+                <a16:creationId xmlns:a16="http://schemas.microsoft.com/office/drawing/2014/main" id="{662C31D2-1FAB-EF10-6FF6-8D8E5B9293CA}"/>
+              </a:ext>
+            </a:extLst>
+          </p:cNvPr>
+          <p:cNvSpPr/>
+          <p:nvPr/>
+        </p:nvSpPr>
+        <p:spPr>
+          <a:xfrm>
+            <a:off x="6283778" y="5372100"/>
+            <a:ext cx="2536371" cy="457200"/>
+          </a:xfrm>
+          <a:prstGeom prst="rect">
+            <a:avLst/>
+          </a:prstGeom>
+        </p:spPr>
+        <p:style>
+          <a:lnRef idx="2">
+            <a:schemeClr val="accent1">
+              <a:shade val="15000"/>
+            </a:schemeClr>
+          </a:lnRef>
+          <a:fillRef idx="1">
+            <a:schemeClr val="accent1"/>
+          </a:fillRef>
+          <a:effectRef idx="0">
+            <a:schemeClr val="accent1"/>
+          </a:effectRef>
+          <a:fontRef idx="minor">
+            <a:schemeClr val="lt1"/>
+          </a:fontRef>
+        </p:style>
+        <p:txBody>
+          <a:bodyPr rtlCol="0" anchor="ctr"/>
+          <a:lstStyle/>
+          <a:p>
+            <a:pPr algn="ctr"/>
+            <a:r>
+              <a:rPr lang="en-US" dirty="0"/>
+              <a:t>Output</a:t>
+            </a:r>
+          </a:p>
+        </p:txBody>
+      </p:sp>
+      <p:sp>
+        <p:nvSpPr>
+          <p:cNvPr id="8" name="Rectangle 7">
+            <a:extLst>
+              <a:ext uri="{FF2B5EF4-FFF2-40B4-BE49-F238E27FC236}">
+                <a16:creationId xmlns:a16="http://schemas.microsoft.com/office/drawing/2014/main" id="{BB7A3115-3CCE-7A50-047D-57529D83E573}"/>
+              </a:ext>
+            </a:extLst>
+          </p:cNvPr>
+          <p:cNvSpPr/>
+          <p:nvPr/>
+        </p:nvSpPr>
+        <p:spPr>
+          <a:xfrm>
+            <a:off x="2901042" y="5372100"/>
+            <a:ext cx="2536371" cy="457200"/>
+          </a:xfrm>
+          <a:prstGeom prst="rect">
+            <a:avLst/>
+          </a:prstGeom>
+        </p:spPr>
+        <p:style>
+          <a:lnRef idx="2">
+            <a:schemeClr val="accent1">
+              <a:shade val="15000"/>
+            </a:schemeClr>
+          </a:lnRef>
+          <a:fillRef idx="1">
+            <a:schemeClr val="accent1"/>
+          </a:fillRef>
+          <a:effectRef idx="0">
+            <a:schemeClr val="accent1"/>
+          </a:effectRef>
+          <a:fontRef idx="minor">
+            <a:schemeClr val="lt1"/>
+          </a:fontRef>
+        </p:style>
+        <p:txBody>
+          <a:bodyPr rtlCol="0" anchor="ctr"/>
+          <a:lstStyle/>
+          <a:p>
+            <a:pPr algn="ctr"/>
+            <a:r>
+              <a:rPr lang="en-US" dirty="0"/>
+              <a:t>Input</a:t>
+            </a:r>
+          </a:p>
+        </p:txBody>
+      </p:sp>
+      <p:cxnSp>
+        <p:nvCxnSpPr>
+          <p:cNvPr id="10" name="Straight Arrow Connector 9">
+            <a:extLst>
+              <a:ext uri="{FF2B5EF4-FFF2-40B4-BE49-F238E27FC236}">
+                <a16:creationId xmlns:a16="http://schemas.microsoft.com/office/drawing/2014/main" id="{D673A8E5-0C3C-262C-7C0A-0939952F55A3}"/>
+              </a:ext>
+            </a:extLst>
+          </p:cNvPr>
+          <p:cNvCxnSpPr>
+            <a:stCxn id="5" idx="0"/>
+            <a:endCxn id="4" idx="2"/>
+          </p:cNvCxnSpPr>
+          <p:nvPr/>
+        </p:nvCxnSpPr>
+        <p:spPr>
+          <a:xfrm flipV="1">
+            <a:off x="5774872" y="3473451"/>
+            <a:ext cx="1" cy="279059"/>
+          </a:xfrm>
+          <a:prstGeom prst="straightConnector1">
+            <a:avLst/>
+          </a:prstGeom>
+          <a:ln>
+            <a:tailEnd type="triangle"/>
+          </a:ln>
+        </p:spPr>
+        <p:style>
+          <a:lnRef idx="1">
+            <a:schemeClr val="accent1"/>
+          </a:lnRef>
+          <a:fillRef idx="0">
+            <a:schemeClr val="accent1"/>
+          </a:fillRef>
+          <a:effectRef idx="0">
+            <a:schemeClr val="accent1"/>
+          </a:effectRef>
+          <a:fontRef idx="minor">
+            <a:schemeClr val="tx1"/>
+          </a:fontRef>
+        </p:style>
+      </p:cxnSp>
+      <p:cxnSp>
+        <p:nvCxnSpPr>
+          <p:cNvPr id="12" name="Straight Arrow Connector 11">
+            <a:extLst>
+              <a:ext uri="{FF2B5EF4-FFF2-40B4-BE49-F238E27FC236}">
+                <a16:creationId xmlns:a16="http://schemas.microsoft.com/office/drawing/2014/main" id="{DBC3AD11-AB93-98B4-F50C-5A831DFA6B30}"/>
+              </a:ext>
+            </a:extLst>
+          </p:cNvPr>
+          <p:cNvCxnSpPr>
+            <a:stCxn id="6" idx="0"/>
+            <a:endCxn id="5" idx="2"/>
+          </p:cNvCxnSpPr>
+          <p:nvPr/>
+        </p:nvCxnSpPr>
+        <p:spPr>
+          <a:xfrm flipV="1">
+            <a:off x="5774871" y="4209710"/>
+            <a:ext cx="1" cy="279059"/>
+          </a:xfrm>
+          <a:prstGeom prst="straightConnector1">
+            <a:avLst/>
+          </a:prstGeom>
+          <a:ln>
+            <a:tailEnd type="triangle"/>
+          </a:ln>
+        </p:spPr>
+        <p:style>
+          <a:lnRef idx="1">
+            <a:schemeClr val="accent1"/>
+          </a:lnRef>
+          <a:fillRef idx="0">
+            <a:schemeClr val="accent1"/>
+          </a:fillRef>
+          <a:effectRef idx="0">
+            <a:schemeClr val="accent1"/>
+          </a:effectRef>
+          <a:fontRef idx="minor">
+            <a:schemeClr val="tx1"/>
+          </a:fontRef>
+        </p:style>
+      </p:cxnSp>
+      <p:cxnSp>
+        <p:nvCxnSpPr>
+          <p:cNvPr id="15" name="Straight Arrow Connector 14">
+            <a:extLst>
+              <a:ext uri="{FF2B5EF4-FFF2-40B4-BE49-F238E27FC236}">
+                <a16:creationId xmlns:a16="http://schemas.microsoft.com/office/drawing/2014/main" id="{C95DFA03-D687-E596-1964-292E3A0E723E}"/>
+              </a:ext>
+            </a:extLst>
+          </p:cNvPr>
+          <p:cNvCxnSpPr>
+            <a:stCxn id="8" idx="0"/>
+            <a:endCxn id="6" idx="2"/>
+          </p:cNvCxnSpPr>
+          <p:nvPr/>
+        </p:nvCxnSpPr>
+        <p:spPr>
+          <a:xfrm flipV="1">
+            <a:off x="4169228" y="4945969"/>
+            <a:ext cx="1605643" cy="426131"/>
+          </a:xfrm>
+          <a:prstGeom prst="straightConnector1">
+            <a:avLst/>
+          </a:prstGeom>
+          <a:ln>
+            <a:tailEnd type="triangle"/>
+          </a:ln>
+        </p:spPr>
+        <p:style>
+          <a:lnRef idx="1">
+            <a:schemeClr val="accent1"/>
+          </a:lnRef>
+          <a:fillRef idx="0">
+            <a:schemeClr val="accent1"/>
+          </a:fillRef>
+          <a:effectRef idx="0">
+            <a:schemeClr val="accent1"/>
+          </a:effectRef>
+          <a:fontRef idx="minor">
+            <a:schemeClr val="tx1"/>
+          </a:fontRef>
+        </p:style>
+      </p:cxnSp>
+      <p:cxnSp>
+        <p:nvCxnSpPr>
+          <p:cNvPr id="17" name="Straight Arrow Connector 16">
+            <a:extLst>
+              <a:ext uri="{FF2B5EF4-FFF2-40B4-BE49-F238E27FC236}">
+                <a16:creationId xmlns:a16="http://schemas.microsoft.com/office/drawing/2014/main" id="{B7878113-6E58-3AAE-A075-2514389869FF}"/>
+              </a:ext>
+            </a:extLst>
+          </p:cNvPr>
+          <p:cNvCxnSpPr>
+            <a:stCxn id="7" idx="0"/>
+            <a:endCxn id="6" idx="2"/>
+          </p:cNvCxnSpPr>
+          <p:nvPr/>
+        </p:nvCxnSpPr>
+        <p:spPr>
+          <a:xfrm flipH="1" flipV="1">
+            <a:off x="5774871" y="4945969"/>
+            <a:ext cx="1777093" cy="426131"/>
+          </a:xfrm>
+          <a:prstGeom prst="straightConnector1">
+            <a:avLst/>
+          </a:prstGeom>
+          <a:ln>
+            <a:tailEnd type="triangle"/>
+          </a:ln>
+        </p:spPr>
+        <p:style>
+          <a:lnRef idx="1">
+            <a:schemeClr val="accent1"/>
+          </a:lnRef>
+          <a:fillRef idx="0">
+            <a:schemeClr val="accent1"/>
+          </a:fillRef>
+          <a:effectRef idx="0">
+            <a:schemeClr val="accent1"/>
+          </a:effectRef>
+          <a:fontRef idx="minor">
+            <a:schemeClr val="tx1"/>
+          </a:fontRef>
+        </p:style>
+      </p:cxnSp>
+    </p:spTree>
+    <p:extLst>
+      <p:ext uri="{BB962C8B-B14F-4D97-AF65-F5344CB8AC3E}">
+        <p14:creationId xmlns:p14="http://schemas.microsoft.com/office/powerpoint/2010/main" val="114366951"/>
+      </p:ext>
+    </p:extLst>
+  </p:cSld>
+  <p:clrMapOvr>
+    <a:masterClrMapping/>
+  </p:clrMapOvr>
+</p:sld>
+</file>
+
+<file path=ppt/slides/slide13.xml><?xml version="1.0" encoding="utf-8"?>
+<p:sld xmlns:a="http://schemas.openxmlformats.org/drawingml/2006/main" xmlns:r="http://schemas.openxmlformats.org/officeDocument/2006/relationships" xmlns:p="http://schemas.openxmlformats.org/presentationml/2006/main">
+  <p:cSld>
+    <p:spTree>
+      <p:nvGrpSpPr>
+        <p:cNvPr id="1" name=""/>
+        <p:cNvGrpSpPr/>
+        <p:nvPr/>
+      </p:nvGrpSpPr>
+      <p:grpSpPr>
+        <a:xfrm>
+          <a:off x="0" y="0"/>
+          <a:ext cx="0" cy="0"/>
+          <a:chOff x="0" y="0"/>
+          <a:chExt cx="0" cy="0"/>
+        </a:xfrm>
+      </p:grpSpPr>
+      <p:sp>
+        <p:nvSpPr>
+          <p:cNvPr id="2" name="Title 1">
+            <a:extLst>
+              <a:ext uri="{FF2B5EF4-FFF2-40B4-BE49-F238E27FC236}">
+                <a16:creationId xmlns:a16="http://schemas.microsoft.com/office/drawing/2014/main" id="{428006C8-66A2-1D6C-7B00-FBF6B7DE5A0A}"/>
+              </a:ext>
+            </a:extLst>
+          </p:cNvPr>
+          <p:cNvSpPr>
+            <a:spLocks noGrp="1"/>
+          </p:cNvSpPr>
+          <p:nvPr>
+            <p:ph type="title"/>
+          </p:nvPr>
+        </p:nvSpPr>
+        <p:spPr/>
+        <p:txBody>
+          <a:bodyPr/>
+          <a:lstStyle/>
+          <a:p>
+            <a:r>
+              <a:rPr lang="en-US" dirty="0"/>
+              <a:t>Random Access Iterators</a:t>
+            </a:r>
+          </a:p>
+        </p:txBody>
+      </p:sp>
+      <p:sp>
+        <p:nvSpPr>
+          <p:cNvPr id="3" name="Content Placeholder 2">
+            <a:extLst>
+              <a:ext uri="{FF2B5EF4-FFF2-40B4-BE49-F238E27FC236}">
+                <a16:creationId xmlns:a16="http://schemas.microsoft.com/office/drawing/2014/main" id="{75315CC4-7825-3E48-3742-C56ADF7CE57E}"/>
+              </a:ext>
+            </a:extLst>
+          </p:cNvPr>
+          <p:cNvSpPr>
+            <a:spLocks noGrp="1"/>
+          </p:cNvSpPr>
+          <p:nvPr>
+            <p:ph idx="1"/>
+          </p:nvPr>
+        </p:nvSpPr>
+        <p:spPr/>
+        <p:txBody>
+          <a:bodyPr/>
+          <a:lstStyle/>
+          <a:p>
+            <a:r>
+              <a:rPr lang="en-US" dirty="0"/>
+              <a:t>Operations:</a:t>
+            </a:r>
+          </a:p>
+          <a:p>
+            <a:pPr lvl="1"/>
+            <a:r>
+              <a:rPr lang="en-US" dirty="0"/>
+              <a:t>Increment </a:t>
+            </a:r>
+            <a:r>
+              <a:rPr lang="en-US" i="1" dirty="0"/>
+              <a:t>and</a:t>
+            </a:r>
+            <a:r>
+              <a:rPr lang="en-US" dirty="0"/>
+              <a:t> decrement</a:t>
+            </a:r>
+          </a:p>
+          <a:p>
+            <a:pPr lvl="1"/>
+            <a:r>
+              <a:rPr lang="en-US" dirty="0"/>
+              <a:t>All six relational operators (</a:t>
+            </a:r>
+            <a:r>
+              <a:rPr lang="en-US" dirty="0">
+                <a:latin typeface="Consolas" panose="020B0609020204030204" pitchFamily="49" charset="0"/>
+                <a:cs typeface="Consolas" panose="020B0609020204030204" pitchFamily="49" charset="0"/>
+              </a:rPr>
+              <a:t>it_1 &lt; it_2</a:t>
+            </a:r>
+            <a:r>
+              <a:rPr lang="en-US" dirty="0"/>
+              <a:t> is a sensible expression)</a:t>
+            </a:r>
+          </a:p>
+          <a:p>
+            <a:pPr lvl="1"/>
+            <a:r>
+              <a:rPr lang="en-US" dirty="0"/>
+              <a:t>Pointer arithmetic (</a:t>
+            </a:r>
+            <a:r>
+              <a:rPr lang="en-US" dirty="0">
+                <a:latin typeface="Consolas" panose="020B0609020204030204" pitchFamily="49" charset="0"/>
+                <a:cs typeface="Consolas" panose="020B0609020204030204" pitchFamily="49" charset="0"/>
+              </a:rPr>
+              <a:t>it_1 + 10</a:t>
+            </a:r>
+            <a:r>
+              <a:rPr lang="en-US" dirty="0"/>
+              <a:t> is a sensible expression)</a:t>
+            </a:r>
+          </a:p>
+          <a:p>
+            <a:pPr lvl="1"/>
+            <a:r>
+              <a:rPr lang="en-US" dirty="0"/>
+              <a:t>Multi-pass (can pass over collection multiple times)</a:t>
+            </a:r>
+          </a:p>
+          <a:p>
+            <a:r>
+              <a:rPr lang="en-US" dirty="0"/>
+              <a:t>Provided By:</a:t>
+            </a:r>
+          </a:p>
+          <a:p>
+            <a:pPr lvl="1"/>
+            <a:r>
+              <a:rPr lang="en-US" dirty="0"/>
+              <a:t>Vector</a:t>
+            </a:r>
+          </a:p>
+          <a:p>
+            <a:pPr lvl="1"/>
+            <a:r>
+              <a:rPr lang="en-US" dirty="0"/>
+              <a:t>Deque</a:t>
+            </a:r>
+          </a:p>
+        </p:txBody>
+      </p:sp>
+    </p:spTree>
+    <p:extLst>
+      <p:ext uri="{BB962C8B-B14F-4D97-AF65-F5344CB8AC3E}">
+        <p14:creationId xmlns:p14="http://schemas.microsoft.com/office/powerpoint/2010/main" val="472201709"/>
+      </p:ext>
+    </p:extLst>
+  </p:cSld>
+  <p:clrMapOvr>
+    <a:masterClrMapping/>
+  </p:clrMapOvr>
+</p:sld>
+</file>
+
+<file path=ppt/slides/slide14.xml><?xml version="1.0" encoding="utf-8"?>
+<p:sld xmlns:a="http://schemas.openxmlformats.org/drawingml/2006/main" xmlns:r="http://schemas.openxmlformats.org/officeDocument/2006/relationships" xmlns:p="http://schemas.openxmlformats.org/presentationml/2006/main">
+  <p:cSld>
+    <p:spTree>
+      <p:nvGrpSpPr>
+        <p:cNvPr id="1" name=""/>
+        <p:cNvGrpSpPr/>
+        <p:nvPr/>
+      </p:nvGrpSpPr>
+      <p:grpSpPr>
+        <a:xfrm>
+          <a:off x="0" y="0"/>
+          <a:ext cx="0" cy="0"/>
+          <a:chOff x="0" y="0"/>
+          <a:chExt cx="0" cy="0"/>
+        </a:xfrm>
+      </p:grpSpPr>
+      <p:sp>
+        <p:nvSpPr>
+          <p:cNvPr id="2" name="Title 1">
+            <a:extLst>
+              <a:ext uri="{FF2B5EF4-FFF2-40B4-BE49-F238E27FC236}">
+                <a16:creationId xmlns:a16="http://schemas.microsoft.com/office/drawing/2014/main" id="{428006C8-66A2-1D6C-7B00-FBF6B7DE5A0A}"/>
+              </a:ext>
+            </a:extLst>
+          </p:cNvPr>
+          <p:cNvSpPr>
+            <a:spLocks noGrp="1"/>
+          </p:cNvSpPr>
+          <p:nvPr>
+            <p:ph type="title"/>
+          </p:nvPr>
+        </p:nvSpPr>
+        <p:spPr/>
+        <p:txBody>
+          <a:bodyPr/>
+          <a:lstStyle/>
+          <a:p>
+            <a:r>
+              <a:rPr lang="en-US" dirty="0"/>
+              <a:t>Bidirectional Iterators</a:t>
+            </a:r>
+          </a:p>
+        </p:txBody>
+      </p:sp>
+      <p:sp>
+        <p:nvSpPr>
+          <p:cNvPr id="3" name="Content Placeholder 2">
+            <a:extLst>
+              <a:ext uri="{FF2B5EF4-FFF2-40B4-BE49-F238E27FC236}">
+                <a16:creationId xmlns:a16="http://schemas.microsoft.com/office/drawing/2014/main" id="{75315CC4-7825-3E48-3742-C56ADF7CE57E}"/>
+              </a:ext>
+            </a:extLst>
+          </p:cNvPr>
+          <p:cNvSpPr>
+            <a:spLocks noGrp="1"/>
+          </p:cNvSpPr>
+          <p:nvPr>
+            <p:ph idx="1"/>
+          </p:nvPr>
+        </p:nvSpPr>
+        <p:spPr/>
+        <p:txBody>
+          <a:bodyPr/>
+          <a:lstStyle/>
+          <a:p>
+            <a:r>
+              <a:rPr lang="en-US" dirty="0"/>
+              <a:t>Operations:</a:t>
+            </a:r>
+          </a:p>
+          <a:p>
+            <a:pPr lvl="1"/>
+            <a:r>
+              <a:rPr lang="en-US" dirty="0"/>
+              <a:t>Increment </a:t>
+            </a:r>
+            <a:r>
+              <a:rPr lang="en-US" i="1" dirty="0"/>
+              <a:t>and</a:t>
+            </a:r>
+            <a:r>
+              <a:rPr lang="en-US" dirty="0"/>
+              <a:t> decrement</a:t>
+            </a:r>
+          </a:p>
+          <a:p>
+            <a:pPr lvl="1"/>
+            <a:r>
+              <a:rPr lang="en-US" dirty="0"/>
+              <a:t>Only == and != supported</a:t>
+            </a:r>
+          </a:p>
+          <a:p>
+            <a:pPr lvl="1"/>
+            <a:r>
+              <a:rPr lang="en-US" dirty="0"/>
+              <a:t>No pointer arithmetic</a:t>
+            </a:r>
+          </a:p>
+          <a:p>
+            <a:pPr lvl="1"/>
+            <a:r>
+              <a:rPr lang="en-US" dirty="0"/>
+              <a:t>Multi-pass (can pass over collection multiple times)</a:t>
+            </a:r>
+          </a:p>
+          <a:p>
+            <a:r>
+              <a:rPr lang="en-US" dirty="0"/>
+              <a:t>Provided By:</a:t>
+            </a:r>
+          </a:p>
+          <a:p>
+            <a:pPr lvl="1"/>
+            <a:r>
+              <a:rPr lang="en-US" dirty="0"/>
+              <a:t>List</a:t>
+            </a:r>
+          </a:p>
+          <a:p>
+            <a:pPr lvl="1"/>
+            <a:r>
+              <a:rPr lang="en-US" dirty="0"/>
+              <a:t>Set/Multiset</a:t>
+            </a:r>
+          </a:p>
+          <a:p>
+            <a:pPr lvl="1"/>
+            <a:r>
+              <a:rPr lang="en-US" dirty="0"/>
+              <a:t>Map/Multimap</a:t>
+            </a:r>
+          </a:p>
+        </p:txBody>
+      </p:sp>
+    </p:spTree>
+    <p:extLst>
+      <p:ext uri="{BB962C8B-B14F-4D97-AF65-F5344CB8AC3E}">
+        <p14:creationId xmlns:p14="http://schemas.microsoft.com/office/powerpoint/2010/main" val="2009109307"/>
+      </p:ext>
+    </p:extLst>
+  </p:cSld>
+  <p:clrMapOvr>
+    <a:masterClrMapping/>
+  </p:clrMapOvr>
+</p:sld>
+</file>
+
+<file path=ppt/slides/slide15.xml><?xml version="1.0" encoding="utf-8"?>
+<p:sld xmlns:a="http://schemas.openxmlformats.org/drawingml/2006/main" xmlns:r="http://schemas.openxmlformats.org/officeDocument/2006/relationships" xmlns:p="http://schemas.openxmlformats.org/presentationml/2006/main">
+  <p:cSld>
+    <p:spTree>
+      <p:nvGrpSpPr>
+        <p:cNvPr id="1" name=""/>
+        <p:cNvGrpSpPr/>
+        <p:nvPr/>
+      </p:nvGrpSpPr>
+      <p:grpSpPr>
+        <a:xfrm>
+          <a:off x="0" y="0"/>
+          <a:ext cx="0" cy="0"/>
+          <a:chOff x="0" y="0"/>
+          <a:chExt cx="0" cy="0"/>
+        </a:xfrm>
+      </p:grpSpPr>
+      <p:sp>
+        <p:nvSpPr>
+          <p:cNvPr id="2" name="Title 1">
+            <a:extLst>
+              <a:ext uri="{FF2B5EF4-FFF2-40B4-BE49-F238E27FC236}">
+                <a16:creationId xmlns:a16="http://schemas.microsoft.com/office/drawing/2014/main" id="{428006C8-66A2-1D6C-7B00-FBF6B7DE5A0A}"/>
+              </a:ext>
+            </a:extLst>
+          </p:cNvPr>
+          <p:cNvSpPr>
+            <a:spLocks noGrp="1"/>
+          </p:cNvSpPr>
+          <p:nvPr>
+            <p:ph type="title"/>
+          </p:nvPr>
+        </p:nvSpPr>
+        <p:spPr/>
+        <p:txBody>
+          <a:bodyPr/>
+          <a:lstStyle/>
+          <a:p>
+            <a:r>
+              <a:rPr lang="en-US" dirty="0"/>
+              <a:t>Forward Iterators</a:t>
+            </a:r>
+          </a:p>
+        </p:txBody>
+      </p:sp>
+      <p:sp>
+        <p:nvSpPr>
+          <p:cNvPr id="3" name="Content Placeholder 2">
+            <a:extLst>
+              <a:ext uri="{FF2B5EF4-FFF2-40B4-BE49-F238E27FC236}">
+                <a16:creationId xmlns:a16="http://schemas.microsoft.com/office/drawing/2014/main" id="{75315CC4-7825-3E48-3742-C56ADF7CE57E}"/>
+              </a:ext>
+            </a:extLst>
+          </p:cNvPr>
+          <p:cNvSpPr>
+            <a:spLocks noGrp="1"/>
+          </p:cNvSpPr>
+          <p:nvPr>
+            <p:ph idx="1"/>
+          </p:nvPr>
+        </p:nvSpPr>
+        <p:spPr/>
+        <p:txBody>
+          <a:bodyPr/>
+          <a:lstStyle/>
+          <a:p>
+            <a:r>
+              <a:rPr lang="en-US" dirty="0"/>
+              <a:t>Operations:</a:t>
+            </a:r>
+          </a:p>
+          <a:p>
+            <a:pPr lvl="1"/>
+            <a:r>
+              <a:rPr lang="en-US" dirty="0"/>
+              <a:t>Increment </a:t>
+            </a:r>
+            <a:r>
+              <a:rPr lang="en-US" i="1" u="sng" dirty="0"/>
+              <a:t>only</a:t>
+            </a:r>
+          </a:p>
+          <a:p>
+            <a:pPr lvl="1"/>
+            <a:r>
+              <a:rPr lang="en-US" dirty="0"/>
+              <a:t>Only == and != supported</a:t>
+            </a:r>
+          </a:p>
+          <a:p>
+            <a:pPr lvl="1"/>
+            <a:r>
+              <a:rPr lang="en-US" dirty="0"/>
+              <a:t>No pointer arithmetic</a:t>
+            </a:r>
+          </a:p>
+          <a:p>
+            <a:pPr lvl="1"/>
+            <a:r>
+              <a:rPr lang="en-US" dirty="0"/>
+              <a:t>Multi-pass (can pass over collection multiple times), but only one way</a:t>
+            </a:r>
+          </a:p>
+          <a:p>
+            <a:r>
+              <a:rPr lang="en-US" dirty="0"/>
+              <a:t>Provided By:</a:t>
+            </a:r>
+          </a:p>
+          <a:p>
+            <a:pPr lvl="1"/>
+            <a:r>
+              <a:rPr lang="en-US" dirty="0"/>
+              <a:t>Forward List</a:t>
+            </a:r>
+          </a:p>
+          <a:p>
+            <a:pPr lvl="1"/>
+            <a:r>
+              <a:rPr lang="en-US" dirty="0"/>
+              <a:t>Unordered Set/Multiset</a:t>
+            </a:r>
+          </a:p>
+          <a:p>
+            <a:pPr lvl="1"/>
+            <a:r>
+              <a:rPr lang="en-US" dirty="0"/>
+              <a:t>Unordered Map/Multimap</a:t>
+            </a:r>
+          </a:p>
+        </p:txBody>
+      </p:sp>
+    </p:spTree>
+    <p:extLst>
+      <p:ext uri="{BB962C8B-B14F-4D97-AF65-F5344CB8AC3E}">
+        <p14:creationId xmlns:p14="http://schemas.microsoft.com/office/powerpoint/2010/main" val="1219201145"/>
+      </p:ext>
+    </p:extLst>
+  </p:cSld>
+  <p:clrMapOvr>
+    <a:masterClrMapping/>
+  </p:clrMapOvr>
+</p:sld>
+</file>
+
+<file path=ppt/slides/slide16.xml><?xml version="1.0" encoding="utf-8"?>
+<p:sld xmlns:a="http://schemas.openxmlformats.org/drawingml/2006/main" xmlns:r="http://schemas.openxmlformats.org/officeDocument/2006/relationships" xmlns:p="http://schemas.openxmlformats.org/presentationml/2006/main">
+  <p:cSld>
+    <p:spTree>
+      <p:nvGrpSpPr>
+        <p:cNvPr id="1" name=""/>
+        <p:cNvGrpSpPr/>
+        <p:nvPr/>
+      </p:nvGrpSpPr>
+      <p:grpSpPr>
+        <a:xfrm>
+          <a:off x="0" y="0"/>
+          <a:ext cx="0" cy="0"/>
+          <a:chOff x="0" y="0"/>
+          <a:chExt cx="0" cy="0"/>
+        </a:xfrm>
+      </p:grpSpPr>
+      <p:sp>
+        <p:nvSpPr>
+          <p:cNvPr id="2" name="Title 1">
+            <a:extLst>
+              <a:ext uri="{FF2B5EF4-FFF2-40B4-BE49-F238E27FC236}">
+                <a16:creationId xmlns:a16="http://schemas.microsoft.com/office/drawing/2014/main" id="{428006C8-66A2-1D6C-7B00-FBF6B7DE5A0A}"/>
+              </a:ext>
+            </a:extLst>
+          </p:cNvPr>
+          <p:cNvSpPr>
+            <a:spLocks noGrp="1"/>
+          </p:cNvSpPr>
+          <p:nvPr>
+            <p:ph type="title"/>
+          </p:nvPr>
+        </p:nvSpPr>
+        <p:spPr/>
+        <p:txBody>
+          <a:bodyPr/>
+          <a:lstStyle/>
+          <a:p>
+            <a:r>
+              <a:rPr lang="en-US" dirty="0"/>
+              <a:t>Input/Output Iterators</a:t>
+            </a:r>
+          </a:p>
+        </p:txBody>
+      </p:sp>
+      <p:sp>
+        <p:nvSpPr>
+          <p:cNvPr id="3" name="Content Placeholder 2">
+            <a:extLst>
+              <a:ext uri="{FF2B5EF4-FFF2-40B4-BE49-F238E27FC236}">
+                <a16:creationId xmlns:a16="http://schemas.microsoft.com/office/drawing/2014/main" id="{75315CC4-7825-3E48-3742-C56ADF7CE57E}"/>
+              </a:ext>
+            </a:extLst>
+          </p:cNvPr>
+          <p:cNvSpPr>
+            <a:spLocks noGrp="1"/>
+          </p:cNvSpPr>
+          <p:nvPr>
+            <p:ph idx="1"/>
+          </p:nvPr>
+        </p:nvSpPr>
+        <p:spPr/>
+        <p:txBody>
+          <a:bodyPr>
+            <a:normAutofit/>
+          </a:bodyPr>
+          <a:lstStyle/>
+          <a:p>
+            <a:r>
+              <a:rPr lang="en-US" dirty="0"/>
+              <a:t>Operations:</a:t>
+            </a:r>
+          </a:p>
+          <a:p>
+            <a:pPr lvl="1"/>
+            <a:r>
+              <a:rPr lang="en-US" dirty="0"/>
+              <a:t>Increment </a:t>
+            </a:r>
+            <a:r>
+              <a:rPr lang="en-US" i="1" u="sng" dirty="0"/>
+              <a:t>only</a:t>
+            </a:r>
+          </a:p>
+          <a:p>
+            <a:pPr lvl="1"/>
+            <a:r>
+              <a:rPr lang="en-US" dirty="0"/>
+              <a:t>Only == and != supported</a:t>
+            </a:r>
+          </a:p>
+          <a:p>
+            <a:pPr lvl="1"/>
+            <a:r>
+              <a:rPr lang="en-US" dirty="0"/>
+              <a:t>No pointer arithmetic</a:t>
+            </a:r>
+          </a:p>
+          <a:p>
+            <a:pPr lvl="1"/>
+            <a:r>
+              <a:rPr lang="en-US" dirty="0"/>
+              <a:t>Single-pass (can only pass over collection once)</a:t>
+            </a:r>
+          </a:p>
+          <a:p>
+            <a:pPr lvl="1"/>
+            <a:r>
+              <a:rPr lang="en-US" dirty="0"/>
+              <a:t>Input Iterators provide read-only access to collection elements</a:t>
+            </a:r>
+          </a:p>
+          <a:p>
+            <a:pPr lvl="1"/>
+            <a:r>
+              <a:rPr lang="en-US" dirty="0"/>
+              <a:t>Output Iterators provide write-only access to collection elements</a:t>
+            </a:r>
+          </a:p>
+          <a:p>
+            <a:r>
+              <a:rPr lang="en-US" dirty="0"/>
+              <a:t>Provided By:</a:t>
+            </a:r>
+          </a:p>
+          <a:p>
+            <a:pPr lvl="1"/>
+            <a:r>
+              <a:rPr lang="en-US" dirty="0" err="1"/>
+              <a:t>Istreams</a:t>
+            </a:r>
+            <a:r>
+              <a:rPr lang="en-US" dirty="0"/>
+              <a:t> (input)</a:t>
+            </a:r>
+          </a:p>
+          <a:p>
+            <a:pPr lvl="1"/>
+            <a:r>
+              <a:rPr lang="en-US" dirty="0" err="1"/>
+              <a:t>Ostreams</a:t>
+            </a:r>
+            <a:r>
+              <a:rPr lang="en-US" dirty="0"/>
+              <a:t> (output)</a:t>
+            </a:r>
+          </a:p>
+        </p:txBody>
+      </p:sp>
+    </p:spTree>
+    <p:extLst>
+      <p:ext uri="{BB962C8B-B14F-4D97-AF65-F5344CB8AC3E}">
+        <p14:creationId xmlns:p14="http://schemas.microsoft.com/office/powerpoint/2010/main" val="1375328029"/>
+      </p:ext>
+    </p:extLst>
+  </p:cSld>
+  <p:clrMapOvr>
+    <a:masterClrMapping/>
+  </p:clrMapOvr>
+</p:sld>
+</file>
+
+<file path=ppt/slides/slide17.xml><?xml version="1.0" encoding="utf-8"?>
+<p:sld xmlns:a="http://schemas.openxmlformats.org/drawingml/2006/main" xmlns:r="http://schemas.openxmlformats.org/officeDocument/2006/relationships" xmlns:p="http://schemas.openxmlformats.org/presentationml/2006/main">
+  <p:cSld>
+    <p:spTree>
+      <p:nvGrpSpPr>
+        <p:cNvPr id="1" name=""/>
+        <p:cNvGrpSpPr/>
+        <p:nvPr/>
+      </p:nvGrpSpPr>
+      <p:grpSpPr>
+        <a:xfrm>
+          <a:off x="0" y="0"/>
+          <a:ext cx="0" cy="0"/>
+          <a:chOff x="0" y="0"/>
+          <a:chExt cx="0" cy="0"/>
+        </a:xfrm>
+      </p:grpSpPr>
+      <p:sp>
+        <p:nvSpPr>
+          <p:cNvPr id="2" name="Title 1">
+            <a:extLst>
+              <a:ext uri="{FF2B5EF4-FFF2-40B4-BE49-F238E27FC236}">
+                <a16:creationId xmlns:a16="http://schemas.microsoft.com/office/drawing/2014/main" id="{285C339A-D318-CBCC-D670-9999BEF10AF1}"/>
+              </a:ext>
+            </a:extLst>
+          </p:cNvPr>
+          <p:cNvSpPr>
+            <a:spLocks noGrp="1"/>
+          </p:cNvSpPr>
+          <p:nvPr>
+            <p:ph type="title"/>
+          </p:nvPr>
+        </p:nvSpPr>
+        <p:spPr/>
+        <p:txBody>
+          <a:bodyPr/>
+          <a:lstStyle/>
+          <a:p>
+            <a:r>
+              <a:rPr lang="en-US" dirty="0"/>
+              <a:t>Pointers?</a:t>
+            </a:r>
+          </a:p>
+        </p:txBody>
+      </p:sp>
+      <p:sp>
+        <p:nvSpPr>
+          <p:cNvPr id="3" name="Content Placeholder 2">
+            <a:extLst>
+              <a:ext uri="{FF2B5EF4-FFF2-40B4-BE49-F238E27FC236}">
+                <a16:creationId xmlns:a16="http://schemas.microsoft.com/office/drawing/2014/main" id="{1E497DA7-D9D8-01F1-A836-DCA8541963FD}"/>
+              </a:ext>
+            </a:extLst>
+          </p:cNvPr>
+          <p:cNvSpPr>
+            <a:spLocks noGrp="1"/>
+          </p:cNvSpPr>
+          <p:nvPr>
+            <p:ph idx="1"/>
+          </p:nvPr>
+        </p:nvSpPr>
+        <p:spPr/>
+        <p:txBody>
+          <a:bodyPr/>
+          <a:lstStyle/>
+          <a:p>
+            <a:r>
+              <a:rPr lang="en-US" dirty="0"/>
+              <a:t>Ordinary pointers have all the operations of random access iterators</a:t>
+            </a:r>
+          </a:p>
+          <a:p>
+            <a:pPr lvl="1"/>
+            <a:r>
+              <a:rPr lang="en-US" dirty="0"/>
+              <a:t>Thus, pointers are a kind of iterator</a:t>
+            </a:r>
+          </a:p>
+          <a:p>
+            <a:pPr lvl="1"/>
+            <a:r>
+              <a:rPr lang="en-US" dirty="0"/>
+              <a:t>This unifies pointers (and therefor arrays) with the other containers in the standard template library.</a:t>
+            </a:r>
+          </a:p>
+          <a:p>
+            <a:pPr lvl="1"/>
+            <a:r>
+              <a:rPr lang="en-US" dirty="0"/>
+              <a:t>That is, an ordinary C-style array is a kind of container and can be treated largely the same way as the other containers.</a:t>
+            </a:r>
+          </a:p>
+        </p:txBody>
+      </p:sp>
+      <p:sp>
+        <p:nvSpPr>
+          <p:cNvPr id="4" name="TextBox 3">
+            <a:extLst>
+              <a:ext uri="{FF2B5EF4-FFF2-40B4-BE49-F238E27FC236}">
+                <a16:creationId xmlns:a16="http://schemas.microsoft.com/office/drawing/2014/main" id="{FF2EBC56-FE5F-35A4-449D-B4E769AA7722}"/>
+              </a:ext>
+            </a:extLst>
+          </p:cNvPr>
+          <p:cNvSpPr txBox="1"/>
+          <p:nvPr/>
+        </p:nvSpPr>
+        <p:spPr>
+          <a:xfrm>
+            <a:off x="838200" y="4280575"/>
+            <a:ext cx="9049272" cy="2031325"/>
+          </a:xfrm>
+          <a:prstGeom prst="rect">
+            <a:avLst/>
+          </a:prstGeom>
+          <a:noFill/>
+        </p:spPr>
+        <p:txBody>
+          <a:bodyPr wrap="none" rtlCol="0">
+            <a:spAutoFit/>
+          </a:bodyPr>
+          <a:lstStyle/>
+          <a:p>
+            <a:r>
+              <a:rPr lang="en-US" dirty="0">
+                <a:latin typeface="Consolas" panose="020B0609020204030204" pitchFamily="49" charset="0"/>
+                <a:cs typeface="Consolas" panose="020B0609020204030204" pitchFamily="49" charset="0"/>
+              </a:rPr>
+              <a:t>#include &lt;iterator&gt;</a:t>
+            </a:r>
+          </a:p>
+          <a:p>
+            <a:endParaRPr lang="en-US" dirty="0">
+              <a:latin typeface="Consolas" panose="020B0609020204030204" pitchFamily="49" charset="0"/>
+              <a:cs typeface="Consolas" panose="020B0609020204030204" pitchFamily="49" charset="0"/>
+            </a:endParaRPr>
+          </a:p>
+          <a:p>
+            <a:r>
+              <a:rPr lang="en-US" b="1" dirty="0">
+                <a:latin typeface="Consolas" panose="020B0609020204030204" pitchFamily="49" charset="0"/>
+                <a:cs typeface="Consolas" panose="020B0609020204030204" pitchFamily="49" charset="0"/>
+              </a:rPr>
+              <a:t>int</a:t>
+            </a:r>
+            <a:r>
+              <a:rPr lang="en-US" dirty="0">
+                <a:latin typeface="Consolas" panose="020B0609020204030204" pitchFamily="49" charset="0"/>
+                <a:cs typeface="Consolas" panose="020B0609020204030204" pitchFamily="49" charset="0"/>
+              </a:rPr>
+              <a:t> array[128];</a:t>
+            </a:r>
+          </a:p>
+          <a:p>
+            <a:endParaRPr lang="en-US" dirty="0">
+              <a:latin typeface="Consolas" panose="020B0609020204030204" pitchFamily="49" charset="0"/>
+              <a:cs typeface="Consolas" panose="020B0609020204030204" pitchFamily="49" charset="0"/>
+            </a:endParaRPr>
+          </a:p>
+          <a:p>
+            <a:r>
+              <a:rPr lang="en-US" b="1" dirty="0">
+                <a:latin typeface="Consolas" panose="020B0609020204030204" pitchFamily="49" charset="0"/>
+                <a:cs typeface="Consolas" panose="020B0609020204030204" pitchFamily="49" charset="0"/>
+              </a:rPr>
+              <a:t>int</a:t>
+            </a:r>
+            <a:r>
+              <a:rPr lang="en-US" dirty="0">
+                <a:latin typeface="Consolas" panose="020B0609020204030204" pitchFamily="49" charset="0"/>
+                <a:cs typeface="Consolas" panose="020B0609020204030204" pitchFamily="49" charset="0"/>
+              </a:rPr>
+              <a:t> *p1 = std::begin(array);  // Points at the first element.</a:t>
+            </a:r>
+          </a:p>
+          <a:p>
+            <a:r>
+              <a:rPr lang="en-US" b="1" dirty="0">
+                <a:latin typeface="Consolas" panose="020B0609020204030204" pitchFamily="49" charset="0"/>
+                <a:cs typeface="Consolas" panose="020B0609020204030204" pitchFamily="49" charset="0"/>
+              </a:rPr>
+              <a:t>int</a:t>
+            </a:r>
+            <a:r>
+              <a:rPr lang="en-US" dirty="0">
+                <a:latin typeface="Consolas" panose="020B0609020204030204" pitchFamily="49" charset="0"/>
+                <a:cs typeface="Consolas" panose="020B0609020204030204" pitchFamily="49" charset="0"/>
+              </a:rPr>
+              <a:t> *p2 = std::end(array);    // Points just past the last element.</a:t>
+            </a:r>
+          </a:p>
+          <a:p>
+            <a:r>
+              <a:rPr lang="en-US" dirty="0">
+                <a:latin typeface="Consolas" panose="020B0609020204030204" pitchFamily="49" charset="0"/>
+                <a:cs typeface="Consolas" panose="020B0609020204030204" pitchFamily="49" charset="0"/>
+              </a:rPr>
+              <a:t>  // std::begin and std::end can also be used with the STL containers.</a:t>
+            </a:r>
+          </a:p>
+        </p:txBody>
+      </p:sp>
+    </p:spTree>
+    <p:extLst>
+      <p:ext uri="{BB962C8B-B14F-4D97-AF65-F5344CB8AC3E}">
+        <p14:creationId xmlns:p14="http://schemas.microsoft.com/office/powerpoint/2010/main" val="207083582"/>
+      </p:ext>
+    </p:extLst>
+  </p:cSld>
+  <p:clrMapOvr>
+    <a:masterClrMapping/>
+  </p:clrMapOvr>
+</p:sld>
+</file>
+
+<file path=ppt/slides/slide18.xml><?xml version="1.0" encoding="utf-8"?>
+<p:sld xmlns:a="http://schemas.openxmlformats.org/drawingml/2006/main" xmlns:r="http://schemas.openxmlformats.org/officeDocument/2006/relationships" xmlns:p="http://schemas.openxmlformats.org/presentationml/2006/main">
+  <p:cSld>
+    <p:spTree>
+      <p:nvGrpSpPr>
+        <p:cNvPr id="1" name=""/>
+        <p:cNvGrpSpPr/>
+        <p:nvPr/>
+      </p:nvGrpSpPr>
+      <p:grpSpPr>
+        <a:xfrm>
+          <a:off x="0" y="0"/>
+          <a:ext cx="0" cy="0"/>
+          <a:chOff x="0" y="0"/>
+          <a:chExt cx="0" cy="0"/>
+        </a:xfrm>
+      </p:grpSpPr>
+      <p:sp>
+        <p:nvSpPr>
+          <p:cNvPr id="4" name="Title 3">
+            <a:extLst>
+              <a:ext uri="{FF2B5EF4-FFF2-40B4-BE49-F238E27FC236}">
+                <a16:creationId xmlns:a16="http://schemas.microsoft.com/office/drawing/2014/main" id="{76ABF1E3-BACF-018F-AED4-5ABEF2D6880F}"/>
+              </a:ext>
+            </a:extLst>
+          </p:cNvPr>
+          <p:cNvSpPr>
+            <a:spLocks noGrp="1"/>
+          </p:cNvSpPr>
+          <p:nvPr>
+            <p:ph type="title"/>
+          </p:nvPr>
+        </p:nvSpPr>
+        <p:spPr/>
+        <p:txBody>
+          <a:bodyPr/>
+          <a:lstStyle/>
+          <a:p>
+            <a:r>
+              <a:rPr lang="en-US" dirty="0"/>
+              <a:t>Iterators and Range-Based For Loops</a:t>
+            </a:r>
+          </a:p>
+        </p:txBody>
+      </p:sp>
+      <p:sp>
+        <p:nvSpPr>
+          <p:cNvPr id="5" name="TextBox 4">
+            <a:extLst>
+              <a:ext uri="{FF2B5EF4-FFF2-40B4-BE49-F238E27FC236}">
+                <a16:creationId xmlns:a16="http://schemas.microsoft.com/office/drawing/2014/main" id="{1EF63481-C24B-419E-A413-38E4E54FC06D}"/>
+              </a:ext>
+            </a:extLst>
+          </p:cNvPr>
+          <p:cNvSpPr txBox="1"/>
+          <p:nvPr/>
+        </p:nvSpPr>
+        <p:spPr>
+          <a:xfrm>
+            <a:off x="838200" y="1690688"/>
+            <a:ext cx="10189008" cy="4801314"/>
+          </a:xfrm>
+          <a:prstGeom prst="rect">
+            <a:avLst/>
+          </a:prstGeom>
+          <a:noFill/>
+        </p:spPr>
+        <p:txBody>
+          <a:bodyPr wrap="none" rtlCol="0">
+            <a:spAutoFit/>
+          </a:bodyPr>
+          <a:lstStyle/>
+          <a:p>
+            <a:r>
+              <a:rPr lang="en-US" dirty="0">
+                <a:latin typeface="Consolas" panose="020B0609020204030204" pitchFamily="49" charset="0"/>
+                <a:cs typeface="Consolas" panose="020B0609020204030204" pitchFamily="49" charset="0"/>
+              </a:rPr>
+              <a:t>vector&lt;</a:t>
+            </a:r>
+            <a:r>
+              <a:rPr lang="en-US" b="1" dirty="0">
+                <a:latin typeface="Consolas" panose="020B0609020204030204" pitchFamily="49" charset="0"/>
+                <a:cs typeface="Consolas" panose="020B0609020204030204" pitchFamily="49" charset="0"/>
+              </a:rPr>
+              <a:t>int</a:t>
+            </a:r>
+            <a:r>
+              <a:rPr lang="en-US" dirty="0">
+                <a:latin typeface="Consolas" panose="020B0609020204030204" pitchFamily="49" charset="0"/>
+                <a:cs typeface="Consolas" panose="020B0609020204030204" pitchFamily="49" charset="0"/>
+              </a:rPr>
+              <a:t>&gt; </a:t>
+            </a:r>
+            <a:r>
+              <a:rPr lang="en-US" dirty="0" err="1">
+                <a:latin typeface="Consolas" panose="020B0609020204030204" pitchFamily="49" charset="0"/>
+                <a:cs typeface="Consolas" panose="020B0609020204030204" pitchFamily="49" charset="0"/>
+              </a:rPr>
+              <a:t>my_vector</a:t>
+            </a:r>
+            <a:r>
+              <a:rPr lang="en-US" dirty="0">
+                <a:latin typeface="Consolas" panose="020B0609020204030204" pitchFamily="49" charset="0"/>
+                <a:cs typeface="Consolas" panose="020B0609020204030204" pitchFamily="49" charset="0"/>
+              </a:rPr>
+              <a:t> = { … };</a:t>
+            </a:r>
+          </a:p>
+          <a:p>
+            <a:r>
+              <a:rPr lang="en-US" dirty="0">
+                <a:latin typeface="Consolas" panose="020B0609020204030204" pitchFamily="49" charset="0"/>
+                <a:cs typeface="Consolas" panose="020B0609020204030204" pitchFamily="49" charset="0"/>
+              </a:rPr>
+              <a:t>for( </a:t>
+            </a:r>
+            <a:r>
+              <a:rPr lang="en-US" b="1" dirty="0">
+                <a:latin typeface="Consolas" panose="020B0609020204030204" pitchFamily="49" charset="0"/>
+                <a:cs typeface="Consolas" panose="020B0609020204030204" pitchFamily="49" charset="0"/>
+              </a:rPr>
+              <a:t>int</a:t>
+            </a:r>
+            <a:r>
+              <a:rPr lang="en-US" dirty="0">
+                <a:latin typeface="Consolas" panose="020B0609020204030204" pitchFamily="49" charset="0"/>
+                <a:cs typeface="Consolas" panose="020B0609020204030204" pitchFamily="49" charset="0"/>
+              </a:rPr>
+              <a:t> x : </a:t>
+            </a:r>
+            <a:r>
+              <a:rPr lang="en-US" dirty="0" err="1">
+                <a:latin typeface="Consolas" panose="020B0609020204030204" pitchFamily="49" charset="0"/>
+                <a:cs typeface="Consolas" panose="020B0609020204030204" pitchFamily="49" charset="0"/>
+              </a:rPr>
+              <a:t>my_vector</a:t>
+            </a:r>
+            <a:r>
+              <a:rPr lang="en-US" dirty="0">
+                <a:latin typeface="Consolas" panose="020B0609020204030204" pitchFamily="49" charset="0"/>
+                <a:cs typeface="Consolas" panose="020B0609020204030204" pitchFamily="49" charset="0"/>
+              </a:rPr>
+              <a:t> ) { … }</a:t>
+            </a:r>
+          </a:p>
+          <a:p>
+            <a:endParaRPr lang="en-US" dirty="0">
+              <a:latin typeface="Consolas" panose="020B0609020204030204" pitchFamily="49" charset="0"/>
+              <a:cs typeface="Consolas" panose="020B0609020204030204" pitchFamily="49" charset="0"/>
+            </a:endParaRPr>
+          </a:p>
+          <a:p>
+            <a:r>
+              <a:rPr lang="en-US" dirty="0">
+                <a:latin typeface="Consolas" panose="020B0609020204030204" pitchFamily="49" charset="0"/>
+                <a:cs typeface="Consolas" panose="020B0609020204030204" pitchFamily="49" charset="0"/>
+              </a:rPr>
+              <a:t>list&lt;</a:t>
+            </a:r>
+            <a:r>
+              <a:rPr lang="en-US" b="1" dirty="0">
+                <a:latin typeface="Consolas" panose="020B0609020204030204" pitchFamily="49" charset="0"/>
+                <a:cs typeface="Consolas" panose="020B0609020204030204" pitchFamily="49" charset="0"/>
+              </a:rPr>
+              <a:t>int</a:t>
+            </a:r>
+            <a:r>
+              <a:rPr lang="en-US" dirty="0">
+                <a:latin typeface="Consolas" panose="020B0609020204030204" pitchFamily="49" charset="0"/>
+                <a:cs typeface="Consolas" panose="020B0609020204030204" pitchFamily="49" charset="0"/>
+              </a:rPr>
+              <a:t>&gt; </a:t>
+            </a:r>
+            <a:r>
+              <a:rPr lang="en-US" dirty="0" err="1">
+                <a:latin typeface="Consolas" panose="020B0609020204030204" pitchFamily="49" charset="0"/>
+                <a:cs typeface="Consolas" panose="020B0609020204030204" pitchFamily="49" charset="0"/>
+              </a:rPr>
+              <a:t>my_list</a:t>
+            </a:r>
+            <a:r>
+              <a:rPr lang="en-US" dirty="0">
+                <a:latin typeface="Consolas" panose="020B0609020204030204" pitchFamily="49" charset="0"/>
+                <a:cs typeface="Consolas" panose="020B0609020204030204" pitchFamily="49" charset="0"/>
+              </a:rPr>
+              <a:t> = { … };</a:t>
+            </a:r>
+          </a:p>
+          <a:p>
+            <a:r>
+              <a:rPr lang="en-US" dirty="0">
+                <a:latin typeface="Consolas" panose="020B0609020204030204" pitchFamily="49" charset="0"/>
+                <a:cs typeface="Consolas" panose="020B0609020204030204" pitchFamily="49" charset="0"/>
+              </a:rPr>
+              <a:t>for( </a:t>
+            </a:r>
+            <a:r>
+              <a:rPr lang="en-US" b="1" dirty="0">
+                <a:latin typeface="Consolas" panose="020B0609020204030204" pitchFamily="49" charset="0"/>
+                <a:cs typeface="Consolas" panose="020B0609020204030204" pitchFamily="49" charset="0"/>
+              </a:rPr>
+              <a:t>int</a:t>
+            </a:r>
+            <a:r>
+              <a:rPr lang="en-US" dirty="0">
+                <a:latin typeface="Consolas" panose="020B0609020204030204" pitchFamily="49" charset="0"/>
+                <a:cs typeface="Consolas" panose="020B0609020204030204" pitchFamily="49" charset="0"/>
+              </a:rPr>
+              <a:t> x : </a:t>
+            </a:r>
+            <a:r>
+              <a:rPr lang="en-US" dirty="0" err="1">
+                <a:latin typeface="Consolas" panose="020B0609020204030204" pitchFamily="49" charset="0"/>
+                <a:cs typeface="Consolas" panose="020B0609020204030204" pitchFamily="49" charset="0"/>
+              </a:rPr>
+              <a:t>my_list</a:t>
+            </a:r>
+            <a:r>
+              <a:rPr lang="en-US" dirty="0">
+                <a:latin typeface="Consolas" panose="020B0609020204030204" pitchFamily="49" charset="0"/>
+                <a:cs typeface="Consolas" panose="020B0609020204030204" pitchFamily="49" charset="0"/>
+              </a:rPr>
+              <a:t> ) { … }</a:t>
+            </a:r>
+          </a:p>
+          <a:p>
+            <a:endParaRPr lang="en-US" dirty="0">
+              <a:latin typeface="Consolas" panose="020B0609020204030204" pitchFamily="49" charset="0"/>
+              <a:cs typeface="Consolas" panose="020B0609020204030204" pitchFamily="49" charset="0"/>
+            </a:endParaRPr>
+          </a:p>
+          <a:p>
+            <a:r>
+              <a:rPr lang="en-US" dirty="0">
+                <a:latin typeface="Consolas" panose="020B0609020204030204" pitchFamily="49" charset="0"/>
+                <a:cs typeface="Consolas" panose="020B0609020204030204" pitchFamily="49" charset="0"/>
+              </a:rPr>
+              <a:t>set&lt;</a:t>
+            </a:r>
+            <a:r>
+              <a:rPr lang="en-US" b="1" dirty="0">
+                <a:latin typeface="Consolas" panose="020B0609020204030204" pitchFamily="49" charset="0"/>
+                <a:cs typeface="Consolas" panose="020B0609020204030204" pitchFamily="49" charset="0"/>
+              </a:rPr>
+              <a:t>int</a:t>
+            </a:r>
+            <a:r>
+              <a:rPr lang="en-US" dirty="0">
+                <a:latin typeface="Consolas" panose="020B0609020204030204" pitchFamily="49" charset="0"/>
+                <a:cs typeface="Consolas" panose="020B0609020204030204" pitchFamily="49" charset="0"/>
+              </a:rPr>
+              <a:t>&gt; </a:t>
+            </a:r>
+            <a:r>
+              <a:rPr lang="en-US" dirty="0" err="1">
+                <a:latin typeface="Consolas" panose="020B0609020204030204" pitchFamily="49" charset="0"/>
+                <a:cs typeface="Consolas" panose="020B0609020204030204" pitchFamily="49" charset="0"/>
+              </a:rPr>
+              <a:t>my_set</a:t>
+            </a:r>
+            <a:r>
+              <a:rPr lang="en-US" dirty="0">
+                <a:latin typeface="Consolas" panose="020B0609020204030204" pitchFamily="49" charset="0"/>
+                <a:cs typeface="Consolas" panose="020B0609020204030204" pitchFamily="49" charset="0"/>
+              </a:rPr>
+              <a:t> = { … };</a:t>
+            </a:r>
+          </a:p>
+          <a:p>
+            <a:r>
+              <a:rPr lang="en-US" dirty="0">
+                <a:latin typeface="Consolas" panose="020B0609020204030204" pitchFamily="49" charset="0"/>
+                <a:cs typeface="Consolas" panose="020B0609020204030204" pitchFamily="49" charset="0"/>
+              </a:rPr>
+              <a:t>for( </a:t>
+            </a:r>
+            <a:r>
+              <a:rPr lang="en-US" b="1" dirty="0">
+                <a:latin typeface="Consolas" panose="020B0609020204030204" pitchFamily="49" charset="0"/>
+                <a:cs typeface="Consolas" panose="020B0609020204030204" pitchFamily="49" charset="0"/>
+              </a:rPr>
+              <a:t>int</a:t>
+            </a:r>
+            <a:r>
+              <a:rPr lang="en-US" dirty="0">
+                <a:latin typeface="Consolas" panose="020B0609020204030204" pitchFamily="49" charset="0"/>
+                <a:cs typeface="Consolas" panose="020B0609020204030204" pitchFamily="49" charset="0"/>
+              </a:rPr>
+              <a:t> x : </a:t>
+            </a:r>
+            <a:r>
+              <a:rPr lang="en-US" dirty="0" err="1">
+                <a:latin typeface="Consolas" panose="020B0609020204030204" pitchFamily="49" charset="0"/>
+                <a:cs typeface="Consolas" panose="020B0609020204030204" pitchFamily="49" charset="0"/>
+              </a:rPr>
+              <a:t>my_set</a:t>
+            </a:r>
+            <a:r>
+              <a:rPr lang="en-US" dirty="0">
+                <a:latin typeface="Consolas" panose="020B0609020204030204" pitchFamily="49" charset="0"/>
+                <a:cs typeface="Consolas" panose="020B0609020204030204" pitchFamily="49" charset="0"/>
+              </a:rPr>
+              <a:t> ) { … }</a:t>
+            </a:r>
+          </a:p>
+          <a:p>
+            <a:endParaRPr lang="en-US" dirty="0">
+              <a:latin typeface="Consolas" panose="020B0609020204030204" pitchFamily="49" charset="0"/>
+              <a:cs typeface="Consolas" panose="020B0609020204030204" pitchFamily="49" charset="0"/>
+            </a:endParaRPr>
+          </a:p>
+          <a:p>
+            <a:r>
+              <a:rPr lang="en-US" dirty="0">
+                <a:latin typeface="Consolas" panose="020B0609020204030204" pitchFamily="49" charset="0"/>
+                <a:cs typeface="Consolas" panose="020B0609020204030204" pitchFamily="49" charset="0"/>
+              </a:rPr>
+              <a:t>string </a:t>
+            </a:r>
+            <a:r>
+              <a:rPr lang="en-US" dirty="0" err="1">
+                <a:latin typeface="Consolas" panose="020B0609020204030204" pitchFamily="49" charset="0"/>
+                <a:cs typeface="Consolas" panose="020B0609020204030204" pitchFamily="49" charset="0"/>
+              </a:rPr>
+              <a:t>my_string</a:t>
+            </a:r>
+            <a:r>
+              <a:rPr lang="en-US" dirty="0">
+                <a:latin typeface="Consolas" panose="020B0609020204030204" pitchFamily="49" charset="0"/>
+                <a:cs typeface="Consolas" panose="020B0609020204030204" pitchFamily="49" charset="0"/>
+              </a:rPr>
+              <a:t> = … ;</a:t>
+            </a:r>
+          </a:p>
+          <a:p>
+            <a:r>
+              <a:rPr lang="en-US" dirty="0">
+                <a:latin typeface="Consolas" panose="020B0609020204030204" pitchFamily="49" charset="0"/>
+                <a:cs typeface="Consolas" panose="020B0609020204030204" pitchFamily="49" charset="0"/>
+              </a:rPr>
+              <a:t>for( </a:t>
+            </a:r>
+            <a:r>
+              <a:rPr lang="en-US" b="1" dirty="0">
+                <a:latin typeface="Consolas" panose="020B0609020204030204" pitchFamily="49" charset="0"/>
+                <a:cs typeface="Consolas" panose="020B0609020204030204" pitchFamily="49" charset="0"/>
+              </a:rPr>
+              <a:t>char</a:t>
+            </a:r>
+            <a:r>
+              <a:rPr lang="en-US" dirty="0">
+                <a:latin typeface="Consolas" panose="020B0609020204030204" pitchFamily="49" charset="0"/>
+                <a:cs typeface="Consolas" panose="020B0609020204030204" pitchFamily="49" charset="0"/>
+              </a:rPr>
+              <a:t> x : </a:t>
+            </a:r>
+            <a:r>
+              <a:rPr lang="en-US" dirty="0" err="1">
+                <a:latin typeface="Consolas" panose="020B0609020204030204" pitchFamily="49" charset="0"/>
+                <a:cs typeface="Consolas" panose="020B0609020204030204" pitchFamily="49" charset="0"/>
+              </a:rPr>
+              <a:t>my_string</a:t>
+            </a:r>
+            <a:r>
+              <a:rPr lang="en-US" dirty="0">
+                <a:latin typeface="Consolas" panose="020B0609020204030204" pitchFamily="49" charset="0"/>
+                <a:cs typeface="Consolas" panose="020B0609020204030204" pitchFamily="49" charset="0"/>
+              </a:rPr>
+              <a:t>) { … }</a:t>
+            </a:r>
+          </a:p>
+          <a:p>
+            <a:endParaRPr lang="en-US" dirty="0">
+              <a:latin typeface="Consolas" panose="020B0609020204030204" pitchFamily="49" charset="0"/>
+              <a:cs typeface="Consolas" panose="020B0609020204030204" pitchFamily="49" charset="0"/>
+            </a:endParaRPr>
+          </a:p>
+          <a:p>
+            <a:r>
+              <a:rPr lang="en-US" b="1" dirty="0">
+                <a:latin typeface="Consolas" panose="020B0609020204030204" pitchFamily="49" charset="0"/>
+                <a:cs typeface="Consolas" panose="020B0609020204030204" pitchFamily="49" charset="0"/>
+              </a:rPr>
+              <a:t>int</a:t>
+            </a:r>
+            <a:r>
+              <a:rPr lang="en-US" dirty="0">
+                <a:latin typeface="Consolas" panose="020B0609020204030204" pitchFamily="49" charset="0"/>
+                <a:cs typeface="Consolas" panose="020B0609020204030204" pitchFamily="49" charset="0"/>
+              </a:rPr>
+              <a:t> </a:t>
+            </a:r>
+            <a:r>
+              <a:rPr lang="en-US" dirty="0" err="1">
+                <a:latin typeface="Consolas" panose="020B0609020204030204" pitchFamily="49" charset="0"/>
+                <a:cs typeface="Consolas" panose="020B0609020204030204" pitchFamily="49" charset="0"/>
+              </a:rPr>
+              <a:t>my_array</a:t>
+            </a:r>
+            <a:r>
+              <a:rPr lang="en-US" dirty="0">
+                <a:latin typeface="Consolas" panose="020B0609020204030204" pitchFamily="49" charset="0"/>
+                <a:cs typeface="Consolas" panose="020B0609020204030204" pitchFamily="49" charset="0"/>
+              </a:rPr>
+              <a:t>[128] = { … };</a:t>
+            </a:r>
+          </a:p>
+          <a:p>
+            <a:r>
+              <a:rPr lang="en-US" dirty="0">
+                <a:latin typeface="Consolas" panose="020B0609020204030204" pitchFamily="49" charset="0"/>
+                <a:cs typeface="Consolas" panose="020B0609020204030204" pitchFamily="49" charset="0"/>
+              </a:rPr>
+              <a:t>for( </a:t>
+            </a:r>
+            <a:r>
+              <a:rPr lang="en-US" b="1" dirty="0">
+                <a:latin typeface="Consolas" panose="020B0609020204030204" pitchFamily="49" charset="0"/>
+                <a:cs typeface="Consolas" panose="020B0609020204030204" pitchFamily="49" charset="0"/>
+              </a:rPr>
+              <a:t>int</a:t>
+            </a:r>
+            <a:r>
+              <a:rPr lang="en-US" dirty="0">
+                <a:latin typeface="Consolas" panose="020B0609020204030204" pitchFamily="49" charset="0"/>
+                <a:cs typeface="Consolas" panose="020B0609020204030204" pitchFamily="49" charset="0"/>
+              </a:rPr>
+              <a:t> x : </a:t>
+            </a:r>
+            <a:r>
+              <a:rPr lang="en-US" dirty="0" err="1">
+                <a:latin typeface="Consolas" panose="020B0609020204030204" pitchFamily="49" charset="0"/>
+                <a:cs typeface="Consolas" panose="020B0609020204030204" pitchFamily="49" charset="0"/>
+              </a:rPr>
+              <a:t>my_array</a:t>
+            </a:r>
+            <a:r>
+              <a:rPr lang="en-US" dirty="0">
+                <a:latin typeface="Consolas" panose="020B0609020204030204" pitchFamily="49" charset="0"/>
+                <a:cs typeface="Consolas" panose="020B0609020204030204" pitchFamily="49" charset="0"/>
+              </a:rPr>
+              <a:t> ) { … }</a:t>
+            </a:r>
+          </a:p>
+          <a:p>
+            <a:endParaRPr lang="en-US" dirty="0">
+              <a:latin typeface="Consolas" panose="020B0609020204030204" pitchFamily="49" charset="0"/>
+              <a:cs typeface="Consolas" panose="020B0609020204030204" pitchFamily="49" charset="0"/>
+            </a:endParaRPr>
+          </a:p>
+          <a:p>
+            <a:r>
+              <a:rPr lang="en-US" dirty="0">
+                <a:latin typeface="Consolas" panose="020B0609020204030204" pitchFamily="49" charset="0"/>
+                <a:cs typeface="Consolas" panose="020B0609020204030204" pitchFamily="49" charset="0"/>
+              </a:rPr>
+              <a:t>// Any container type that provides appropriate iterators can be used this way.</a:t>
+            </a:r>
+          </a:p>
+          <a:p>
+            <a:r>
+              <a:rPr lang="en-US" dirty="0">
+                <a:latin typeface="Consolas" panose="020B0609020204030204" pitchFamily="49" charset="0"/>
+                <a:cs typeface="Consolas" panose="020B0609020204030204" pitchFamily="49" charset="0"/>
+              </a:rPr>
+              <a:t>// </a:t>
+            </a:r>
+            <a:r>
+              <a:rPr lang="en-US" i="1" dirty="0">
+                <a:latin typeface="Consolas" panose="020B0609020204030204" pitchFamily="49" charset="0"/>
+                <a:cs typeface="Consolas" panose="020B0609020204030204" pitchFamily="49" charset="0"/>
+              </a:rPr>
+              <a:t>Including your own classes!</a:t>
+            </a:r>
+          </a:p>
+        </p:txBody>
+      </p:sp>
+    </p:spTree>
+    <p:extLst>
+      <p:ext uri="{BB962C8B-B14F-4D97-AF65-F5344CB8AC3E}">
+        <p14:creationId xmlns:p14="http://schemas.microsoft.com/office/powerpoint/2010/main" val="4101406521"/>
+      </p:ext>
+    </p:extLst>
+  </p:cSld>
+  <p:clrMapOvr>
+    <a:masterClrMapping/>
+  </p:clrMapOvr>
+</p:sld>
+</file>
+
+<file path=ppt/slides/slide19.xml><?xml version="1.0" encoding="utf-8"?>
+<p:sld xmlns:a="http://schemas.openxmlformats.org/drawingml/2006/main" xmlns:r="http://schemas.openxmlformats.org/officeDocument/2006/relationships" xmlns:p="http://schemas.openxmlformats.org/presentationml/2006/main">
+  <p:cSld>
+    <p:spTree>
+      <p:nvGrpSpPr>
+        <p:cNvPr id="1" name=""/>
+        <p:cNvGrpSpPr/>
+        <p:nvPr/>
+      </p:nvGrpSpPr>
+      <p:grpSpPr>
+        <a:xfrm>
+          <a:off x="0" y="0"/>
+          <a:ext cx="0" cy="0"/>
+          <a:chOff x="0" y="0"/>
+          <a:chExt cx="0" cy="0"/>
+        </a:xfrm>
+      </p:grpSpPr>
+      <p:sp>
+        <p:nvSpPr>
+          <p:cNvPr id="2" name="Title 1">
+            <a:extLst>
+              <a:ext uri="{FF2B5EF4-FFF2-40B4-BE49-F238E27FC236}">
+                <a16:creationId xmlns:a16="http://schemas.microsoft.com/office/drawing/2014/main" id="{506BB01F-53CD-A574-F702-77D0891E9A89}"/>
+              </a:ext>
+            </a:extLst>
+          </p:cNvPr>
+          <p:cNvSpPr>
+            <a:spLocks noGrp="1"/>
+          </p:cNvSpPr>
+          <p:nvPr>
+            <p:ph type="title"/>
+          </p:nvPr>
+        </p:nvSpPr>
+        <p:spPr/>
+        <p:txBody>
+          <a:bodyPr/>
+          <a:lstStyle/>
+          <a:p>
+            <a:r>
+              <a:rPr lang="en-US" dirty="0"/>
+              <a:t>Algorithms!</a:t>
+            </a:r>
+          </a:p>
+        </p:txBody>
+      </p:sp>
+      <p:sp>
+        <p:nvSpPr>
+          <p:cNvPr id="3" name="Content Placeholder 2">
+            <a:extLst>
+              <a:ext uri="{FF2B5EF4-FFF2-40B4-BE49-F238E27FC236}">
+                <a16:creationId xmlns:a16="http://schemas.microsoft.com/office/drawing/2014/main" id="{79888748-363F-6248-156F-4D25E894FDFF}"/>
+              </a:ext>
+            </a:extLst>
+          </p:cNvPr>
+          <p:cNvSpPr>
+            <a:spLocks noGrp="1"/>
+          </p:cNvSpPr>
+          <p:nvPr>
+            <p:ph idx="1"/>
+          </p:nvPr>
+        </p:nvSpPr>
+        <p:spPr/>
+        <p:txBody>
+          <a:bodyPr/>
+          <a:lstStyle/>
+          <a:p>
+            <a:endParaRPr lang="en-US"/>
+          </a:p>
+        </p:txBody>
+      </p:sp>
+    </p:spTree>
+    <p:extLst>
+      <p:ext uri="{BB962C8B-B14F-4D97-AF65-F5344CB8AC3E}">
+        <p14:creationId xmlns:p14="http://schemas.microsoft.com/office/powerpoint/2010/main" val="3899668626"/>
+      </p:ext>
+    </p:extLst>
+  </p:cSld>
+  <p:clrMapOvr>
+    <a:masterClrMapping/>
+  </p:clrMapOvr>
+</p:sld>
+</file>
+
 <file path=ppt/slides/slide2.xml><?xml version="1.0" encoding="utf-8"?>
 <p:sld xmlns:a="http://schemas.openxmlformats.org/drawingml/2006/main" xmlns:r="http://schemas.openxmlformats.org/officeDocument/2006/relationships" xmlns:p="http://schemas.openxmlformats.org/presentationml/2006/main">
   <p:cSld>
@@ -3534,7 +6231,7 @@
             <a:pPr lvl="1"/>
             <a:r>
               <a:rPr lang="en-US" dirty="0"/>
-              <a:t>What is and is not part of the STL is informal. The standard doesn’t talk about the STL at all. However, people do.</a:t>
+              <a:t>What is and is not part of the STL is informal. The standard doesn’t talk about the STL, per se. However, people do.</a:t>
             </a:r>
           </a:p>
         </p:txBody>
@@ -3592,7 +6289,7 @@
           <a:p>
             <a:r>
               <a:rPr lang="en-US" dirty="0"/>
-              <a:t>Three Main Parts of the STL</a:t>
+              <a:t>Three Main Parts of the STL (pre-2020)</a:t>
             </a:r>
           </a:p>
         </p:txBody>
@@ -4340,7 +7037,7 @@
           <p:nvPr>
             <p:extLst>
               <p:ext uri="{D42A27DB-BD31-4B8C-83A1-F6EECF244321}">
-                <p14:modId xmlns:p14="http://schemas.microsoft.com/office/powerpoint/2010/main" val="4227504964"/>
+                <p14:modId xmlns:p14="http://schemas.microsoft.com/office/powerpoint/2010/main" val="1744460956"/>
               </p:ext>
             </p:extLst>
           </p:nvPr>
@@ -4428,7 +7125,7 @@
                     <a:p>
                       <a:r>
                         <a:rPr lang="en-US" dirty="0"/>
-                        <a:t>A collection of keys where the keys are stored in sorted order. Normally sets are implemented as Red-Black trees, although that is not required.</a:t>
+                        <a:t>A collection of keys where the keys are stored in sorted order. Normally sets are implemented as Red-Black trees, although that is not formally required.</a:t>
                       </a:r>
                     </a:p>
                   </a:txBody>
@@ -4508,7 +7205,7 @@
                     <a:p>
                       <a:r>
                         <a:rPr lang="en-US" dirty="0"/>
-                        <a:t>A collection of (key, value) pairs stored in key-sorted order. Normally maps are implemented as Red-Black trees of pairs.</a:t>
+                        <a:t>A collection of (key, value) pairs stored in key-sorted order. Normally maps are implemented as Red-Black trees of pairs, although that is not formally required.</a:t>
                       </a:r>
                     </a:p>
                   </a:txBody>
@@ -4641,7 +7338,7 @@
           <p:nvPr>
             <p:extLst>
               <p:ext uri="{D42A27DB-BD31-4B8C-83A1-F6EECF244321}">
-                <p14:modId xmlns:p14="http://schemas.microsoft.com/office/powerpoint/2010/main" val="2603770681"/>
+                <p14:modId xmlns:p14="http://schemas.microsoft.com/office/powerpoint/2010/main" val="3743826061"/>
               </p:ext>
             </p:extLst>
           </p:nvPr>
@@ -4743,7 +7440,7 @@
                     <a:p>
                       <a:r>
                         <a:rPr lang="en-US" dirty="0"/>
-                        <a:t>A collection of keys where the keys are typically stored in a hash table. Hashing can be faster in some situations, and not others.</a:t>
+                        <a:t>A collection of keys where the keys are typically stored in a hash table. Hashing can be faster in some situations, but not others.</a:t>
                       </a:r>
                     </a:p>
                   </a:txBody>
@@ -5526,6 +8223,182 @@
     <p:extLst>
       <p:ext uri="{BB962C8B-B14F-4D97-AF65-F5344CB8AC3E}">
         <p14:creationId xmlns:p14="http://schemas.microsoft.com/office/powerpoint/2010/main" val="1407554492"/>
+      </p:ext>
+    </p:extLst>
+  </p:cSld>
+  <p:clrMapOvr>
+    <a:masterClrMapping/>
+  </p:clrMapOvr>
+</p:sld>
+</file>
+
+<file path=ppt/slides/slide9.xml><?xml version="1.0" encoding="utf-8"?>
+<p:sld xmlns:a="http://schemas.openxmlformats.org/drawingml/2006/main" xmlns:r="http://schemas.openxmlformats.org/officeDocument/2006/relationships" xmlns:p="http://schemas.openxmlformats.org/presentationml/2006/main">
+  <p:cSld>
+    <p:spTree>
+      <p:nvGrpSpPr>
+        <p:cNvPr id="1" name=""/>
+        <p:cNvGrpSpPr/>
+        <p:nvPr/>
+      </p:nvGrpSpPr>
+      <p:grpSpPr>
+        <a:xfrm>
+          <a:off x="0" y="0"/>
+          <a:ext cx="0" cy="0"/>
+          <a:chOff x="0" y="0"/>
+          <a:chExt cx="0" cy="0"/>
+        </a:xfrm>
+      </p:grpSpPr>
+      <p:sp>
+        <p:nvSpPr>
+          <p:cNvPr id="3" name="Title 2">
+            <a:extLst>
+              <a:ext uri="{FF2B5EF4-FFF2-40B4-BE49-F238E27FC236}">
+                <a16:creationId xmlns:a16="http://schemas.microsoft.com/office/drawing/2014/main" id="{7C50F6A5-B5FB-ECB8-B364-EE7196692005}"/>
+              </a:ext>
+            </a:extLst>
+          </p:cNvPr>
+          <p:cNvSpPr>
+            <a:spLocks noGrp="1"/>
+          </p:cNvSpPr>
+          <p:nvPr>
+            <p:ph type="title"/>
+          </p:nvPr>
+        </p:nvSpPr>
+        <p:spPr/>
+        <p:txBody>
+          <a:bodyPr/>
+          <a:lstStyle/>
+          <a:p>
+            <a:r>
+              <a:rPr lang="en-US" dirty="0"/>
+              <a:t>Iterators</a:t>
+            </a:r>
+          </a:p>
+        </p:txBody>
+      </p:sp>
+      <p:sp>
+        <p:nvSpPr>
+          <p:cNvPr id="4" name="Content Placeholder 3">
+            <a:extLst>
+              <a:ext uri="{FF2B5EF4-FFF2-40B4-BE49-F238E27FC236}">
+                <a16:creationId xmlns:a16="http://schemas.microsoft.com/office/drawing/2014/main" id="{ADB57CDA-F7B3-B77F-83DD-0D67CCD592A5}"/>
+              </a:ext>
+            </a:extLst>
+          </p:cNvPr>
+          <p:cNvSpPr>
+            <a:spLocks noGrp="1"/>
+          </p:cNvSpPr>
+          <p:nvPr>
+            <p:ph idx="1"/>
+          </p:nvPr>
+        </p:nvSpPr>
+        <p:spPr/>
+        <p:txBody>
+          <a:bodyPr/>
+          <a:lstStyle/>
+          <a:p>
+            <a:r>
+              <a:rPr lang="en-US" dirty="0"/>
+              <a:t>An iterator is a pointer-like object…</a:t>
+            </a:r>
+          </a:p>
+          <a:p>
+            <a:pPr lvl="1"/>
+            <a:r>
+              <a:rPr lang="en-US" dirty="0"/>
+              <a:t>… in the sense that it supports similar operations as do pointers.</a:t>
+            </a:r>
+          </a:p>
+          <a:p>
+            <a:r>
+              <a:rPr lang="en-US" dirty="0"/>
+              <a:t>Iterator is not a type!</a:t>
+            </a:r>
+          </a:p>
+          <a:p>
+            <a:r>
+              <a:rPr lang="en-US" dirty="0"/>
+              <a:t>Every container has a separate iterator type that can be used to “point into” that container…</a:t>
+            </a:r>
+          </a:p>
+          <a:p>
+            <a:pPr lvl="1"/>
+            <a:r>
+              <a:rPr lang="en-US" dirty="0"/>
+              <a:t>… and thus access the elements of that container.</a:t>
+            </a:r>
+          </a:p>
+          <a:p>
+            <a:r>
+              <a:rPr lang="en-US" dirty="0"/>
+              <a:t>Every container has </a:t>
+            </a:r>
+            <a:r>
+              <a:rPr lang="en-US" dirty="0">
+                <a:latin typeface="Consolas" panose="020B0609020204030204" pitchFamily="49" charset="0"/>
+                <a:cs typeface="Consolas" panose="020B0609020204030204" pitchFamily="49" charset="0"/>
+              </a:rPr>
+              <a:t>begin</a:t>
+            </a:r>
+            <a:r>
+              <a:rPr lang="en-US" dirty="0"/>
+              <a:t> and </a:t>
+            </a:r>
+            <a:r>
+              <a:rPr lang="en-US" dirty="0">
+                <a:latin typeface="Consolas" panose="020B0609020204030204" pitchFamily="49" charset="0"/>
+                <a:cs typeface="Consolas" panose="020B0609020204030204" pitchFamily="49" charset="0"/>
+              </a:rPr>
+              <a:t>end</a:t>
+            </a:r>
+            <a:r>
+              <a:rPr lang="en-US" dirty="0"/>
+              <a:t> methods</a:t>
+            </a:r>
+          </a:p>
+          <a:p>
+            <a:pPr lvl="1"/>
+            <a:r>
+              <a:rPr lang="en-US" dirty="0">
+                <a:latin typeface="Consolas" panose="020B0609020204030204" pitchFamily="49" charset="0"/>
+                <a:cs typeface="Consolas" panose="020B0609020204030204" pitchFamily="49" charset="0"/>
+              </a:rPr>
+              <a:t>begin( )</a:t>
+            </a:r>
+            <a:r>
+              <a:rPr lang="en-US" dirty="0"/>
+              <a:t> returns an iterator that points at the </a:t>
+            </a:r>
+            <a:r>
+              <a:rPr lang="en-US" i="1" dirty="0"/>
+              <a:t>first element</a:t>
+            </a:r>
+          </a:p>
+          <a:p>
+            <a:pPr lvl="1"/>
+            <a:r>
+              <a:rPr lang="en-US" dirty="0">
+                <a:latin typeface="Consolas" panose="020B0609020204030204" pitchFamily="49" charset="0"/>
+                <a:cs typeface="Consolas" panose="020B0609020204030204" pitchFamily="49" charset="0"/>
+              </a:rPr>
+              <a:t>end( ) </a:t>
+            </a:r>
+            <a:r>
+              <a:rPr lang="en-US" dirty="0"/>
+              <a:t>returns an iterator that points </a:t>
+            </a:r>
+            <a:r>
+              <a:rPr lang="en-US" i="1" dirty="0"/>
+              <a:t>just past the last element</a:t>
+            </a:r>
+          </a:p>
+        </p:txBody>
+      </p:sp>
+    </p:spTree>
+    <p:extLst>
+      <p:ext uri="{BB962C8B-B14F-4D97-AF65-F5344CB8AC3E}">
+        <p14:creationId xmlns:p14="http://schemas.microsoft.com/office/powerpoint/2010/main" val="194152691"/>
       </p:ext>
     </p:extLst>
   </p:cSld>

</xml_diff>